<commit_message>
Updates to slides and lab script
</commit_message>
<xml_diff>
--- a/lectures/NTBEA 2019.pptx
+++ b/lectures/NTBEA 2019.pptx
@@ -5,27 +5,33 @@
     <p:sldMasterId id="2147483648" r:id="rId1"/>
   </p:sldMasterIdLst>
   <p:notesMasterIdLst>
-    <p:notesMasterId r:id="rId20"/>
+    <p:notesMasterId r:id="rId26"/>
   </p:notesMasterIdLst>
   <p:sldIdLst>
     <p:sldId id="256" r:id="rId2"/>
     <p:sldId id="259" r:id="rId3"/>
     <p:sldId id="269" r:id="rId4"/>
-    <p:sldId id="300" r:id="rId5"/>
-    <p:sldId id="309" r:id="rId6"/>
-    <p:sldId id="318" r:id="rId7"/>
-    <p:sldId id="319" r:id="rId8"/>
-    <p:sldId id="282" r:id="rId9"/>
-    <p:sldId id="317" r:id="rId10"/>
-    <p:sldId id="320" r:id="rId11"/>
-    <p:sldId id="321" r:id="rId12"/>
-    <p:sldId id="322" r:id="rId13"/>
-    <p:sldId id="312" r:id="rId14"/>
-    <p:sldId id="261" r:id="rId15"/>
-    <p:sldId id="257" r:id="rId16"/>
-    <p:sldId id="268" r:id="rId17"/>
-    <p:sldId id="263" r:id="rId18"/>
-    <p:sldId id="260" r:id="rId19"/>
+    <p:sldId id="323" r:id="rId5"/>
+    <p:sldId id="324" r:id="rId6"/>
+    <p:sldId id="325" r:id="rId7"/>
+    <p:sldId id="326" r:id="rId8"/>
+    <p:sldId id="327" r:id="rId9"/>
+    <p:sldId id="328" r:id="rId10"/>
+    <p:sldId id="300" r:id="rId11"/>
+    <p:sldId id="309" r:id="rId12"/>
+    <p:sldId id="318" r:id="rId13"/>
+    <p:sldId id="319" r:id="rId14"/>
+    <p:sldId id="282" r:id="rId15"/>
+    <p:sldId id="317" r:id="rId16"/>
+    <p:sldId id="320" r:id="rId17"/>
+    <p:sldId id="321" r:id="rId18"/>
+    <p:sldId id="322" r:id="rId19"/>
+    <p:sldId id="312" r:id="rId20"/>
+    <p:sldId id="261" r:id="rId21"/>
+    <p:sldId id="257" r:id="rId22"/>
+    <p:sldId id="268" r:id="rId23"/>
+    <p:sldId id="263" r:id="rId24"/>
+    <p:sldId id="260" r:id="rId25"/>
   </p:sldIdLst>
   <p:sldSz cx="12192000" cy="6858000"/>
   <p:notesSz cx="6858000" cy="9144000"/>
@@ -668,7 +674,7 @@
           <a:p>
             <a:fld id="{3E818362-D73A-CB42-A4A1-F65E2F24140A}" type="slidenum">
               <a:rPr lang="en-US" smtClean="0"/>
-              <a:t>17</a:t>
+              <a:t>23</a:t>
             </a:fld>
             <a:endParaRPr lang="en-US"/>
           </a:p>
@@ -843,7 +849,7 @@
           <a:p>
             <a:fld id="{CE94FE3C-2A76-B244-98EC-8FC850B57904}" type="slidenum">
               <a:rPr lang="en-US" smtClean="0"/>
-              <a:t>4</a:t>
+              <a:t>10</a:t>
             </a:fld>
             <a:endParaRPr lang="en-US"/>
           </a:p>
@@ -931,7 +937,7 @@
           <a:p>
             <a:fld id="{CE94FE3C-2A76-B244-98EC-8FC850B57904}" type="slidenum">
               <a:rPr lang="en-US" smtClean="0"/>
-              <a:t>5</a:t>
+              <a:t>11</a:t>
             </a:fld>
             <a:endParaRPr lang="en-US"/>
           </a:p>
@@ -1019,7 +1025,7 @@
           <a:p>
             <a:fld id="{CE94FE3C-2A76-B244-98EC-8FC850B57904}" type="slidenum">
               <a:rPr lang="en-US" smtClean="0"/>
-              <a:t>7</a:t>
+              <a:t>13</a:t>
             </a:fld>
             <a:endParaRPr lang="en-US"/>
           </a:p>
@@ -1107,7 +1113,7 @@
           <a:p>
             <a:fld id="{CE94FE3C-2A76-B244-98EC-8FC850B57904}" type="slidenum">
               <a:rPr lang="en-US" smtClean="0"/>
-              <a:t>8</a:t>
+              <a:t>14</a:t>
             </a:fld>
             <a:endParaRPr lang="en-US"/>
           </a:p>
@@ -1194,7 +1200,7 @@
           <a:p>
             <a:fld id="{3E818362-D73A-CB42-A4A1-F65E2F24140A}" type="slidenum">
               <a:rPr lang="en-US" smtClean="0"/>
-              <a:t>9</a:t>
+              <a:t>15</a:t>
             </a:fld>
             <a:endParaRPr lang="en-US"/>
           </a:p>
@@ -1282,7 +1288,7 @@
           <a:p>
             <a:fld id="{CE94FE3C-2A76-B244-98EC-8FC850B57904}" type="slidenum">
               <a:rPr lang="en-US" smtClean="0"/>
-              <a:t>13</a:t>
+              <a:t>19</a:t>
             </a:fld>
             <a:endParaRPr lang="en-US"/>
           </a:p>
@@ -1369,7 +1375,7 @@
           <a:p>
             <a:fld id="{3E818362-D73A-CB42-A4A1-F65E2F24140A}" type="slidenum">
               <a:rPr lang="en-US" smtClean="0"/>
-              <a:t>14</a:t>
+              <a:t>20</a:t>
             </a:fld>
             <a:endParaRPr lang="en-US"/>
           </a:p>
@@ -4698,1556 +4704,6 @@
           <p:cNvPr id="2" name="Title 1">
             <a:extLst>
               <a:ext uri="{FF2B5EF4-FFF2-40B4-BE49-F238E27FC236}">
-                <a16:creationId xmlns:a16="http://schemas.microsoft.com/office/drawing/2014/main" id="{22D87973-71D4-3743-8196-1E879BCCD0DB}"/>
-              </a:ext>
-            </a:extLst>
-          </p:cNvPr>
-          <p:cNvSpPr>
-            <a:spLocks noGrp="1"/>
-          </p:cNvSpPr>
-          <p:nvPr>
-            <p:ph type="title"/>
-          </p:nvPr>
-        </p:nvSpPr>
-        <p:spPr/>
-        <p:txBody>
-          <a:bodyPr/>
-          <a:lstStyle/>
-          <a:p>
-            <a:r>
-              <a:rPr lang="en-GB" dirty="0"/>
-              <a:t>Note how exploration term grows for less sampled options</a:t>
-            </a:r>
-            <a:endParaRPr lang="en-US" dirty="0"/>
-          </a:p>
-        </p:txBody>
-      </p:sp>
-      <p:pic>
-        <p:nvPicPr>
-          <p:cNvPr id="11" name="Content Placeholder 10">
-            <a:extLst>
-              <a:ext uri="{FF2B5EF4-FFF2-40B4-BE49-F238E27FC236}">
-                <a16:creationId xmlns:a16="http://schemas.microsoft.com/office/drawing/2014/main" id="{8ECA68DD-32CF-304A-9A1F-5814BAF5F23F}"/>
-              </a:ext>
-            </a:extLst>
-          </p:cNvPr>
-          <p:cNvPicPr>
-            <a:picLocks noGrp="1" noChangeAspect="1"/>
-          </p:cNvPicPr>
-          <p:nvPr>
-            <p:ph idx="1"/>
-          </p:nvPr>
-        </p:nvPicPr>
-        <p:blipFill>
-          <a:blip r:embed="rId2"/>
-          <a:stretch>
-            <a:fillRect/>
-          </a:stretch>
-        </p:blipFill>
-        <p:spPr>
-          <a:xfrm>
-            <a:off x="2736799" y="1825625"/>
-            <a:ext cx="6718403" cy="4351338"/>
-          </a:xfrm>
-        </p:spPr>
-      </p:pic>
-    </p:spTree>
-    <p:extLst>
-      <p:ext uri="{BB962C8B-B14F-4D97-AF65-F5344CB8AC3E}">
-        <p14:creationId xmlns:p14="http://schemas.microsoft.com/office/powerpoint/2010/main" val="3629898845"/>
-      </p:ext>
-    </p:extLst>
-  </p:cSld>
-  <p:clrMapOvr>
-    <a:masterClrMapping/>
-  </p:clrMapOvr>
-</p:sld>
-</file>
-
-<file path=ppt/slides/slide11.xml><?xml version="1.0" encoding="utf-8"?>
-<p:sld xmlns:a="http://schemas.openxmlformats.org/drawingml/2006/main" xmlns:r="http://schemas.openxmlformats.org/officeDocument/2006/relationships" xmlns:p="http://schemas.openxmlformats.org/presentationml/2006/main">
-  <p:cSld>
-    <p:spTree>
-      <p:nvGrpSpPr>
-        <p:cNvPr id="1" name=""/>
-        <p:cNvGrpSpPr/>
-        <p:nvPr/>
-      </p:nvGrpSpPr>
-      <p:grpSpPr>
-        <a:xfrm>
-          <a:off x="0" y="0"/>
-          <a:ext cx="0" cy="0"/>
-          <a:chOff x="0" y="0"/>
-          <a:chExt cx="0" cy="0"/>
-        </a:xfrm>
-      </p:grpSpPr>
-      <p:sp>
-        <p:nvSpPr>
-          <p:cNvPr id="2" name="Title 1">
-            <a:extLst>
-              <a:ext uri="{FF2B5EF4-FFF2-40B4-BE49-F238E27FC236}">
-                <a16:creationId xmlns:a16="http://schemas.microsoft.com/office/drawing/2014/main" id="{982D53F3-643C-D048-9B6B-94E591237721}"/>
-              </a:ext>
-            </a:extLst>
-          </p:cNvPr>
-          <p:cNvSpPr>
-            <a:spLocks noGrp="1"/>
-          </p:cNvSpPr>
-          <p:nvPr>
-            <p:ph type="title"/>
-          </p:nvPr>
-        </p:nvSpPr>
-        <p:spPr/>
-        <p:txBody>
-          <a:bodyPr/>
-          <a:lstStyle/>
-          <a:p>
-            <a:r>
-              <a:rPr lang="en-GB" dirty="0"/>
-              <a:t>Note how promising options are sampled more frequently</a:t>
-            </a:r>
-            <a:endParaRPr lang="en-US" dirty="0"/>
-          </a:p>
-        </p:txBody>
-      </p:sp>
-      <p:pic>
-        <p:nvPicPr>
-          <p:cNvPr id="11" name="Content Placeholder 10">
-            <a:extLst>
-              <a:ext uri="{FF2B5EF4-FFF2-40B4-BE49-F238E27FC236}">
-                <a16:creationId xmlns:a16="http://schemas.microsoft.com/office/drawing/2014/main" id="{93F47FCC-4917-594C-B55D-EFE06A7E1A40}"/>
-              </a:ext>
-            </a:extLst>
-          </p:cNvPr>
-          <p:cNvPicPr>
-            <a:picLocks noGrp="1" noChangeAspect="1"/>
-          </p:cNvPicPr>
-          <p:nvPr>
-            <p:ph idx="1"/>
-          </p:nvPr>
-        </p:nvPicPr>
-        <p:blipFill>
-          <a:blip r:embed="rId2"/>
-          <a:stretch>
-            <a:fillRect/>
-          </a:stretch>
-        </p:blipFill>
-        <p:spPr>
-          <a:xfrm>
-            <a:off x="2732172" y="1825625"/>
-            <a:ext cx="6727656" cy="4351338"/>
-          </a:xfrm>
-        </p:spPr>
-      </p:pic>
-    </p:spTree>
-    <p:extLst>
-      <p:ext uri="{BB962C8B-B14F-4D97-AF65-F5344CB8AC3E}">
-        <p14:creationId xmlns:p14="http://schemas.microsoft.com/office/powerpoint/2010/main" val="2448134660"/>
-      </p:ext>
-    </p:extLst>
-  </p:cSld>
-  <p:clrMapOvr>
-    <a:masterClrMapping/>
-  </p:clrMapOvr>
-</p:sld>
-</file>
-
-<file path=ppt/slides/slide12.xml><?xml version="1.0" encoding="utf-8"?>
-<p:sld xmlns:a="http://schemas.openxmlformats.org/drawingml/2006/main" xmlns:r="http://schemas.openxmlformats.org/officeDocument/2006/relationships" xmlns:p="http://schemas.openxmlformats.org/presentationml/2006/main">
-  <p:cSld>
-    <p:spTree>
-      <p:nvGrpSpPr>
-        <p:cNvPr id="1" name=""/>
-        <p:cNvGrpSpPr/>
-        <p:nvPr/>
-      </p:nvGrpSpPr>
-      <p:grpSpPr>
-        <a:xfrm>
-          <a:off x="0" y="0"/>
-          <a:ext cx="0" cy="0"/>
-          <a:chOff x="0" y="0"/>
-          <a:chExt cx="0" cy="0"/>
-        </a:xfrm>
-      </p:grpSpPr>
-      <p:sp>
-        <p:nvSpPr>
-          <p:cNvPr id="2" name="Title 1">
-            <a:extLst>
-              <a:ext uri="{FF2B5EF4-FFF2-40B4-BE49-F238E27FC236}">
-                <a16:creationId xmlns:a16="http://schemas.microsoft.com/office/drawing/2014/main" id="{C9794518-1665-144A-83C6-852D52E90D93}"/>
-              </a:ext>
-            </a:extLst>
-          </p:cNvPr>
-          <p:cNvSpPr>
-            <a:spLocks noGrp="1"/>
-          </p:cNvSpPr>
-          <p:nvPr>
-            <p:ph type="title"/>
-          </p:nvPr>
-        </p:nvSpPr>
-        <p:spPr/>
-        <p:txBody>
-          <a:bodyPr/>
-          <a:lstStyle/>
-          <a:p>
-            <a:r>
-              <a:rPr lang="en-GB" dirty="0"/>
-              <a:t>So far, that’s fine for a single parameter</a:t>
-            </a:r>
-            <a:endParaRPr lang="en-US" dirty="0"/>
-          </a:p>
-        </p:txBody>
-      </p:sp>
-      <p:sp>
-        <p:nvSpPr>
-          <p:cNvPr id="3" name="Content Placeholder 2">
-            <a:extLst>
-              <a:ext uri="{FF2B5EF4-FFF2-40B4-BE49-F238E27FC236}">
-                <a16:creationId xmlns:a16="http://schemas.microsoft.com/office/drawing/2014/main" id="{9FFBCA1E-0520-1641-BCAA-503A575FBB8C}"/>
-              </a:ext>
-            </a:extLst>
-          </p:cNvPr>
-          <p:cNvSpPr>
-            <a:spLocks noGrp="1"/>
-          </p:cNvSpPr>
-          <p:nvPr>
-            <p:ph idx="1"/>
-          </p:nvPr>
-        </p:nvSpPr>
-        <p:spPr/>
-        <p:txBody>
-          <a:bodyPr/>
-          <a:lstStyle/>
-          <a:p>
-            <a:r>
-              <a:rPr lang="en-GB" dirty="0"/>
-              <a:t>But we need to choose the best </a:t>
-            </a:r>
-            <a:r>
-              <a:rPr lang="en-GB" sz="9600" dirty="0"/>
-              <a:t>COMBINATION</a:t>
-            </a:r>
-            <a:r>
-              <a:rPr lang="en-GB" dirty="0"/>
-              <a:t> of parameters!</a:t>
-            </a:r>
-          </a:p>
-          <a:p>
-            <a:r>
-              <a:rPr lang="en-GB" dirty="0"/>
-              <a:t>Hence the N-Tuple model</a:t>
-            </a:r>
-          </a:p>
-          <a:p>
-            <a:r>
-              <a:rPr lang="en-GB" dirty="0"/>
-              <a:t>Scales well for a large number of parameters</a:t>
-            </a:r>
-            <a:endParaRPr lang="en-US" dirty="0"/>
-          </a:p>
-        </p:txBody>
-      </p:sp>
-    </p:spTree>
-    <p:extLst>
-      <p:ext uri="{BB962C8B-B14F-4D97-AF65-F5344CB8AC3E}">
-        <p14:creationId xmlns:p14="http://schemas.microsoft.com/office/powerpoint/2010/main" val="1276659026"/>
-      </p:ext>
-    </p:extLst>
-  </p:cSld>
-  <p:clrMapOvr>
-    <a:masterClrMapping/>
-  </p:clrMapOvr>
-</p:sld>
-</file>
-
-<file path=ppt/slides/slide13.xml><?xml version="1.0" encoding="utf-8"?>
-<p:sld xmlns:a="http://schemas.openxmlformats.org/drawingml/2006/main" xmlns:r="http://schemas.openxmlformats.org/officeDocument/2006/relationships" xmlns:p="http://schemas.openxmlformats.org/presentationml/2006/main">
-  <p:cSld>
-    <p:spTree>
-      <p:nvGrpSpPr>
-        <p:cNvPr id="1" name=""/>
-        <p:cNvGrpSpPr/>
-        <p:nvPr/>
-      </p:nvGrpSpPr>
-      <p:grpSpPr>
-        <a:xfrm>
-          <a:off x="0" y="0"/>
-          <a:ext cx="0" cy="0"/>
-          <a:chOff x="0" y="0"/>
-          <a:chExt cx="0" cy="0"/>
-        </a:xfrm>
-      </p:grpSpPr>
-      <p:sp>
-        <p:nvSpPr>
-          <p:cNvPr id="2" name="Title 1">
-            <a:extLst>
-              <a:ext uri="{FF2B5EF4-FFF2-40B4-BE49-F238E27FC236}">
-                <a16:creationId xmlns:a16="http://schemas.microsoft.com/office/drawing/2014/main" id="{53781C9A-27D2-3645-A553-0E6262955F2C}"/>
-              </a:ext>
-            </a:extLst>
-          </p:cNvPr>
-          <p:cNvSpPr>
-            <a:spLocks noGrp="1"/>
-          </p:cNvSpPr>
-          <p:nvPr>
-            <p:ph type="title"/>
-          </p:nvPr>
-        </p:nvSpPr>
-        <p:spPr/>
-        <p:txBody>
-          <a:bodyPr/>
-          <a:lstStyle/>
-          <a:p>
-            <a:r>
-              <a:rPr lang="en-GB" dirty="0"/>
-              <a:t>Rolling Horizon Evolution</a:t>
-            </a:r>
-            <a:endParaRPr lang="en-US" dirty="0"/>
-          </a:p>
-        </p:txBody>
-      </p:sp>
-      <p:sp>
-        <p:nvSpPr>
-          <p:cNvPr id="3" name="Content Placeholder 2">
-            <a:extLst>
-              <a:ext uri="{FF2B5EF4-FFF2-40B4-BE49-F238E27FC236}">
-                <a16:creationId xmlns:a16="http://schemas.microsoft.com/office/drawing/2014/main" id="{B8B367FB-17C6-834D-A502-8EF343713406}"/>
-              </a:ext>
-            </a:extLst>
-          </p:cNvPr>
-          <p:cNvSpPr>
-            <a:spLocks noGrp="1"/>
-          </p:cNvSpPr>
-          <p:nvPr>
-            <p:ph idx="1"/>
-          </p:nvPr>
-        </p:nvSpPr>
-        <p:spPr>
-          <a:xfrm>
-            <a:off x="1085088" y="1475232"/>
-            <a:ext cx="9314688" cy="5157216"/>
-          </a:xfrm>
-        </p:spPr>
-        <p:txBody>
-          <a:bodyPr>
-            <a:normAutofit/>
-          </a:bodyPr>
-          <a:lstStyle/>
-          <a:p>
-            <a:r>
-              <a:rPr lang="en-GB" dirty="0"/>
-              <a:t>Evolves sequences of actions/numbers in real-time</a:t>
-            </a:r>
-          </a:p>
-          <a:p>
-            <a:pPr lvl="1"/>
-            <a:r>
-              <a:rPr lang="en-GB" dirty="0"/>
-              <a:t>E.g.: [left, thrust, shoot, shoot, left, thrust, right, …]</a:t>
-            </a:r>
-          </a:p>
-          <a:p>
-            <a:r>
-              <a:rPr lang="en-GB" dirty="0"/>
-              <a:t>These are interpreted as action sequences and simulated on a copy of the game</a:t>
-            </a:r>
-          </a:p>
-          <a:p>
-            <a:r>
-              <a:rPr lang="en-GB" dirty="0"/>
-              <a:t>Game score may be used as the fitness function</a:t>
-            </a:r>
-          </a:p>
-          <a:p>
-            <a:r>
-              <a:rPr lang="en-GB" dirty="0"/>
-              <a:t>Choose the sequence that leads to the best score, and take the first action</a:t>
-            </a:r>
-          </a:p>
-          <a:p>
-            <a:pPr lvl="1"/>
-            <a:r>
-              <a:rPr lang="en-GB" dirty="0"/>
-              <a:t>If using a shift buffer, then shift the sequence forward and add a random action to the end to seed the population for the next decision step of the game</a:t>
-            </a:r>
-          </a:p>
-          <a:p>
-            <a:r>
-              <a:rPr lang="en-GB" dirty="0"/>
-              <a:t>Then repeat for each step / turn of the game</a:t>
-            </a:r>
-          </a:p>
-          <a:p>
-            <a:pPr marL="0" indent="0">
-              <a:buNone/>
-            </a:pPr>
-            <a:endParaRPr lang="en-US" dirty="0"/>
-          </a:p>
-        </p:txBody>
-      </p:sp>
-    </p:spTree>
-    <p:extLst>
-      <p:ext uri="{BB962C8B-B14F-4D97-AF65-F5344CB8AC3E}">
-        <p14:creationId xmlns:p14="http://schemas.microsoft.com/office/powerpoint/2010/main" val="3929685423"/>
-      </p:ext>
-    </p:extLst>
-  </p:cSld>
-  <p:clrMapOvr>
-    <a:masterClrMapping/>
-  </p:clrMapOvr>
-</p:sld>
-</file>
-
-<file path=ppt/slides/slide14.xml><?xml version="1.0" encoding="utf-8"?>
-<p:sld xmlns:a="http://schemas.openxmlformats.org/drawingml/2006/main" xmlns:r="http://schemas.openxmlformats.org/officeDocument/2006/relationships" xmlns:p="http://schemas.openxmlformats.org/presentationml/2006/main">
-  <p:cSld>
-    <p:spTree>
-      <p:nvGrpSpPr>
-        <p:cNvPr id="1" name=""/>
-        <p:cNvGrpSpPr/>
-        <p:nvPr/>
-      </p:nvGrpSpPr>
-      <p:grpSpPr>
-        <a:xfrm>
-          <a:off x="0" y="0"/>
-          <a:ext cx="0" cy="0"/>
-          <a:chOff x="0" y="0"/>
-          <a:chExt cx="0" cy="0"/>
-        </a:xfrm>
-      </p:grpSpPr>
-      <p:sp>
-        <p:nvSpPr>
-          <p:cNvPr id="2" name="Title 1">
-            <a:extLst>
-              <a:ext uri="{FF2B5EF4-FFF2-40B4-BE49-F238E27FC236}">
-                <a16:creationId xmlns:a16="http://schemas.microsoft.com/office/drawing/2014/main" id="{132512BE-E2AA-6F41-8966-64262C2B0A46}"/>
-              </a:ext>
-            </a:extLst>
-          </p:cNvPr>
-          <p:cNvSpPr>
-            <a:spLocks noGrp="1"/>
-          </p:cNvSpPr>
-          <p:nvPr>
-            <p:ph type="title"/>
-          </p:nvPr>
-        </p:nvSpPr>
-        <p:spPr/>
-        <p:txBody>
-          <a:bodyPr/>
-          <a:lstStyle/>
-          <a:p>
-            <a:r>
-              <a:rPr lang="en-US" dirty="0"/>
-              <a:t>Test Game: Simplified Planet Wars</a:t>
-            </a:r>
-          </a:p>
-        </p:txBody>
-      </p:sp>
-      <p:sp>
-        <p:nvSpPr>
-          <p:cNvPr id="3" name="Content Placeholder 2">
-            <a:extLst>
-              <a:ext uri="{FF2B5EF4-FFF2-40B4-BE49-F238E27FC236}">
-                <a16:creationId xmlns:a16="http://schemas.microsoft.com/office/drawing/2014/main" id="{591A7210-42FF-3D46-8AD5-00A68D125037}"/>
-              </a:ext>
-            </a:extLst>
-          </p:cNvPr>
-          <p:cNvSpPr>
-            <a:spLocks noGrp="1"/>
-          </p:cNvSpPr>
-          <p:nvPr>
-            <p:ph idx="1"/>
-          </p:nvPr>
-        </p:nvSpPr>
-        <p:spPr>
-          <a:xfrm>
-            <a:off x="658368" y="1825624"/>
-            <a:ext cx="5136790" cy="4745863"/>
-          </a:xfrm>
-        </p:spPr>
-        <p:txBody>
-          <a:bodyPr>
-            <a:normAutofit fontScale="77500" lnSpcReduction="20000"/>
-          </a:bodyPr>
-          <a:lstStyle/>
-          <a:p>
-            <a:r>
-              <a:rPr lang="en-US" dirty="0"/>
-              <a:t>Random initial states (ownership, planet sizes and number of ships)</a:t>
-            </a:r>
-          </a:p>
-          <a:p>
-            <a:r>
-              <a:rPr lang="en-US" dirty="0"/>
-              <a:t>Each disc is a planet showing the number of ships and ownership (+</a:t>
-            </a:r>
-            <a:r>
-              <a:rPr lang="en-US" dirty="0" err="1"/>
-              <a:t>ve</a:t>
-            </a:r>
-            <a:r>
-              <a:rPr lang="en-US" dirty="0"/>
-              <a:t> green)</a:t>
-            </a:r>
-          </a:p>
-          <a:p>
-            <a:r>
-              <a:rPr lang="en-US" dirty="0"/>
-              <a:t>Planets grow ships are rate proportional to their size</a:t>
-            </a:r>
-          </a:p>
-          <a:p>
-            <a:r>
-              <a:rPr lang="en-US" dirty="0"/>
-              <a:t>Ships can only be transferred via each player’s buffer and their planet of focus</a:t>
-            </a:r>
-          </a:p>
-          <a:p>
-            <a:r>
-              <a:rPr lang="en-US" dirty="0"/>
-              <a:t>Aim: wipe out opponent, or have most ships at time limit</a:t>
-            </a:r>
-          </a:p>
-          <a:p>
-            <a:r>
-              <a:rPr lang="en-US" dirty="0"/>
-              <a:t>Win/loss game (player is only rewarded for winning, margin does not matter)</a:t>
-            </a:r>
-          </a:p>
-          <a:p>
-            <a:r>
-              <a:rPr lang="en-US" dirty="0"/>
-              <a:t>Constant speed irrespective of number of planets</a:t>
-            </a:r>
-          </a:p>
-        </p:txBody>
-      </p:sp>
-      <p:pic>
-        <p:nvPicPr>
-          <p:cNvPr id="4" name="Picture 3">
-            <a:extLst>
-              <a:ext uri="{FF2B5EF4-FFF2-40B4-BE49-F238E27FC236}">
-                <a16:creationId xmlns:a16="http://schemas.microsoft.com/office/drawing/2014/main" id="{E965B035-0D31-EC40-830A-69D4DD2F1190}"/>
-              </a:ext>
-            </a:extLst>
-          </p:cNvPr>
-          <p:cNvPicPr>
-            <a:picLocks noChangeAspect="1"/>
-          </p:cNvPicPr>
-          <p:nvPr/>
-        </p:nvPicPr>
-        <p:blipFill>
-          <a:blip r:embed="rId3"/>
-          <a:stretch>
-            <a:fillRect/>
-          </a:stretch>
-        </p:blipFill>
-        <p:spPr>
-          <a:xfrm>
-            <a:off x="5795158" y="1574439"/>
-            <a:ext cx="6172652" cy="4853709"/>
-          </a:xfrm>
-          <a:prstGeom prst="rect">
-            <a:avLst/>
-          </a:prstGeom>
-        </p:spPr>
-      </p:pic>
-    </p:spTree>
-    <p:extLst>
-      <p:ext uri="{BB962C8B-B14F-4D97-AF65-F5344CB8AC3E}">
-        <p14:creationId xmlns:p14="http://schemas.microsoft.com/office/powerpoint/2010/main" val="1195228240"/>
-      </p:ext>
-    </p:extLst>
-  </p:cSld>
-  <p:clrMapOvr>
-    <a:masterClrMapping/>
-  </p:clrMapOvr>
-</p:sld>
-</file>
-
-<file path=ppt/slides/slide15.xml><?xml version="1.0" encoding="utf-8"?>
-<p:sld xmlns:a="http://schemas.openxmlformats.org/drawingml/2006/main" xmlns:r="http://schemas.openxmlformats.org/officeDocument/2006/relationships" xmlns:p="http://schemas.openxmlformats.org/presentationml/2006/main">
-  <p:cSld>
-    <p:spTree>
-      <p:nvGrpSpPr>
-        <p:cNvPr id="1" name=""/>
-        <p:cNvGrpSpPr/>
-        <p:nvPr/>
-      </p:nvGrpSpPr>
-      <p:grpSpPr>
-        <a:xfrm>
-          <a:off x="0" y="0"/>
-          <a:ext cx="0" cy="0"/>
-          <a:chOff x="0" y="0"/>
-          <a:chExt cx="0" cy="0"/>
-        </a:xfrm>
-      </p:grpSpPr>
-      <p:sp>
-        <p:nvSpPr>
-          <p:cNvPr id="2" name="Title 1">
-            <a:extLst>
-              <a:ext uri="{FF2B5EF4-FFF2-40B4-BE49-F238E27FC236}">
-                <a16:creationId xmlns:a16="http://schemas.microsoft.com/office/drawing/2014/main" id="{FC31FE78-169C-094B-9A7C-31FE0D133AA7}"/>
-              </a:ext>
-            </a:extLst>
-          </p:cNvPr>
-          <p:cNvSpPr>
-            <a:spLocks noGrp="1"/>
-          </p:cNvSpPr>
-          <p:nvPr>
-            <p:ph type="title"/>
-          </p:nvPr>
-        </p:nvSpPr>
-        <p:spPr/>
-        <p:txBody>
-          <a:bodyPr/>
-          <a:lstStyle/>
-          <a:p>
-            <a:r>
-              <a:rPr lang="en-US" dirty="0"/>
-              <a:t>Results</a:t>
-            </a:r>
-          </a:p>
-        </p:txBody>
-      </p:sp>
-      <p:sp>
-        <p:nvSpPr>
-          <p:cNvPr id="3" name="Content Placeholder 2">
-            <a:extLst>
-              <a:ext uri="{FF2B5EF4-FFF2-40B4-BE49-F238E27FC236}">
-                <a16:creationId xmlns:a16="http://schemas.microsoft.com/office/drawing/2014/main" id="{2E0DDBF8-FE8C-544D-9A4B-3328157FDE8E}"/>
-              </a:ext>
-            </a:extLst>
-          </p:cNvPr>
-          <p:cNvSpPr>
-            <a:spLocks noGrp="1"/>
-          </p:cNvSpPr>
-          <p:nvPr>
-            <p:ph idx="1"/>
-          </p:nvPr>
-        </p:nvSpPr>
-        <p:spPr>
-          <a:xfrm>
-            <a:off x="629781" y="1893825"/>
-            <a:ext cx="5289468" cy="4351338"/>
-          </a:xfrm>
-        </p:spPr>
-        <p:txBody>
-          <a:bodyPr>
-            <a:normAutofit fontScale="92500" lnSpcReduction="10000"/>
-          </a:bodyPr>
-          <a:lstStyle/>
-          <a:p>
-            <a:r>
-              <a:rPr lang="en-US" dirty="0"/>
-              <a:t>Extremely noisy fitness function</a:t>
-            </a:r>
-          </a:p>
-          <a:p>
-            <a:pPr lvl="1"/>
-            <a:r>
-              <a:rPr lang="en-US" dirty="0"/>
-              <a:t>RMHC (1) uses no resampling and is very poor</a:t>
-            </a:r>
-          </a:p>
-          <a:p>
-            <a:pPr lvl="1"/>
-            <a:r>
-              <a:rPr lang="en-US" dirty="0"/>
-              <a:t>RMHC (5) resamples but wastes budget</a:t>
-            </a:r>
-          </a:p>
-          <a:p>
-            <a:pPr lvl="1"/>
-            <a:r>
-              <a:rPr lang="en-US" dirty="0"/>
-              <a:t>CMA-ES is also poor until we increase its sample budget (hence no longer a fair comparison)</a:t>
-            </a:r>
-          </a:p>
-          <a:p>
-            <a:r>
-              <a:rPr lang="en-US" dirty="0"/>
-              <a:t>NTBEA and SMAC have the most sophisticated models and perform by far the best </a:t>
-            </a:r>
-          </a:p>
-          <a:p>
-            <a:r>
-              <a:rPr lang="en-US" dirty="0"/>
-              <a:t>When operating with the small sample budget</a:t>
-            </a:r>
-          </a:p>
-        </p:txBody>
-      </p:sp>
-      <p:pic>
-        <p:nvPicPr>
-          <p:cNvPr id="4" name="Picture 3">
-            <a:extLst>
-              <a:ext uri="{FF2B5EF4-FFF2-40B4-BE49-F238E27FC236}">
-                <a16:creationId xmlns:a16="http://schemas.microsoft.com/office/drawing/2014/main" id="{9DD328D3-017A-1E4E-884E-F12DA07A532D}"/>
-              </a:ext>
-            </a:extLst>
-          </p:cNvPr>
-          <p:cNvPicPr>
-            <a:picLocks noChangeAspect="1"/>
-          </p:cNvPicPr>
-          <p:nvPr/>
-        </p:nvPicPr>
-        <p:blipFill>
-          <a:blip r:embed="rId2"/>
-          <a:stretch>
-            <a:fillRect/>
-          </a:stretch>
-        </p:blipFill>
-        <p:spPr>
-          <a:xfrm>
-            <a:off x="5710829" y="700644"/>
-            <a:ext cx="5740064" cy="5747657"/>
-          </a:xfrm>
-          <a:prstGeom prst="rect">
-            <a:avLst/>
-          </a:prstGeom>
-        </p:spPr>
-      </p:pic>
-    </p:spTree>
-    <p:extLst>
-      <p:ext uri="{BB962C8B-B14F-4D97-AF65-F5344CB8AC3E}">
-        <p14:creationId xmlns:p14="http://schemas.microsoft.com/office/powerpoint/2010/main" val="682079936"/>
-      </p:ext>
-    </p:extLst>
-  </p:cSld>
-  <p:clrMapOvr>
-    <a:masterClrMapping/>
-  </p:clrMapOvr>
-</p:sld>
-</file>
-
-<file path=ppt/slides/slide16.xml><?xml version="1.0" encoding="utf-8"?>
-<p:sld xmlns:a="http://schemas.openxmlformats.org/drawingml/2006/main" xmlns:r="http://schemas.openxmlformats.org/officeDocument/2006/relationships" xmlns:p="http://schemas.openxmlformats.org/presentationml/2006/main">
-  <p:cSld>
-    <p:spTree>
-      <p:nvGrpSpPr>
-        <p:cNvPr id="1" name=""/>
-        <p:cNvGrpSpPr/>
-        <p:nvPr/>
-      </p:nvGrpSpPr>
-      <p:grpSpPr>
-        <a:xfrm>
-          <a:off x="0" y="0"/>
-          <a:ext cx="0" cy="0"/>
-          <a:chOff x="0" y="0"/>
-          <a:chExt cx="0" cy="0"/>
-        </a:xfrm>
-      </p:grpSpPr>
-      <p:sp>
-        <p:nvSpPr>
-          <p:cNvPr id="2" name="Title 1">
-            <a:extLst>
-              <a:ext uri="{FF2B5EF4-FFF2-40B4-BE49-F238E27FC236}">
-                <a16:creationId xmlns:a16="http://schemas.microsoft.com/office/drawing/2014/main" id="{CB7CB16B-C51F-224C-955F-F7306A74C728}"/>
-              </a:ext>
-            </a:extLst>
-          </p:cNvPr>
-          <p:cNvSpPr>
-            <a:spLocks noGrp="1"/>
-          </p:cNvSpPr>
-          <p:nvPr>
-            <p:ph type="title"/>
-          </p:nvPr>
-        </p:nvSpPr>
-        <p:spPr/>
-        <p:txBody>
-          <a:bodyPr/>
-          <a:lstStyle/>
-          <a:p>
-            <a:r>
-              <a:rPr lang="en-US" dirty="0"/>
-              <a:t>Insight into parameter combinations</a:t>
-            </a:r>
-            <a:br>
-              <a:rPr lang="en-US" dirty="0"/>
-            </a:br>
-            <a:r>
-              <a:rPr lang="en-US" dirty="0"/>
-              <a:t>(Typically 1,</a:t>
-            </a:r>
-            <a:r>
-              <a:rPr lang="en-US" b="1" dirty="0"/>
-              <a:t>2</a:t>
-            </a:r>
-            <a:r>
-              <a:rPr lang="en-US" dirty="0"/>
-              <a:t>,3 and N-Tuple)</a:t>
-            </a:r>
-          </a:p>
-        </p:txBody>
-      </p:sp>
-      <p:sp>
-        <p:nvSpPr>
-          <p:cNvPr id="3" name="Content Placeholder 2">
-            <a:extLst>
-              <a:ext uri="{FF2B5EF4-FFF2-40B4-BE49-F238E27FC236}">
-                <a16:creationId xmlns:a16="http://schemas.microsoft.com/office/drawing/2014/main" id="{CEAE3185-FB96-B447-8E4B-CE294B78AFF8}"/>
-              </a:ext>
-            </a:extLst>
-          </p:cNvPr>
-          <p:cNvSpPr>
-            <a:spLocks noGrp="1"/>
-          </p:cNvSpPr>
-          <p:nvPr>
-            <p:ph idx="1"/>
-          </p:nvPr>
-        </p:nvSpPr>
-        <p:spPr>
-          <a:xfrm>
-            <a:off x="838200" y="1825625"/>
-            <a:ext cx="4291940" cy="4351338"/>
-          </a:xfrm>
-        </p:spPr>
-        <p:txBody>
-          <a:bodyPr/>
-          <a:lstStyle/>
-          <a:p>
-            <a:r>
-              <a:rPr lang="en-US" dirty="0"/>
-              <a:t>For each combination we also get more complete stats including standard error, min and max</a:t>
-            </a:r>
-          </a:p>
-        </p:txBody>
-      </p:sp>
-      <p:pic>
-        <p:nvPicPr>
-          <p:cNvPr id="4" name="Picture 3">
-            <a:extLst>
-              <a:ext uri="{FF2B5EF4-FFF2-40B4-BE49-F238E27FC236}">
-                <a16:creationId xmlns:a16="http://schemas.microsoft.com/office/drawing/2014/main" id="{5C4DA62A-2925-9C41-8FE5-11F961F5B8CF}"/>
-              </a:ext>
-            </a:extLst>
-          </p:cNvPr>
-          <p:cNvPicPr>
-            <a:picLocks noChangeAspect="1"/>
-          </p:cNvPicPr>
-          <p:nvPr/>
-        </p:nvPicPr>
-        <p:blipFill>
-          <a:blip r:embed="rId2"/>
-          <a:stretch>
-            <a:fillRect/>
-          </a:stretch>
-        </p:blipFill>
-        <p:spPr>
-          <a:xfrm>
-            <a:off x="5667004" y="1825625"/>
-            <a:ext cx="5686796" cy="4543574"/>
-          </a:xfrm>
-          <a:prstGeom prst="rect">
-            <a:avLst/>
-          </a:prstGeom>
-        </p:spPr>
-      </p:pic>
-    </p:spTree>
-    <p:extLst>
-      <p:ext uri="{BB962C8B-B14F-4D97-AF65-F5344CB8AC3E}">
-        <p14:creationId xmlns:p14="http://schemas.microsoft.com/office/powerpoint/2010/main" val="3542740012"/>
-      </p:ext>
-    </p:extLst>
-  </p:cSld>
-  <p:clrMapOvr>
-    <a:masterClrMapping/>
-  </p:clrMapOvr>
-</p:sld>
-</file>
-
-<file path=ppt/slides/slide17.xml><?xml version="1.0" encoding="utf-8"?>
-<p:sld xmlns:a="http://schemas.openxmlformats.org/drawingml/2006/main" xmlns:r="http://schemas.openxmlformats.org/officeDocument/2006/relationships" xmlns:p="http://schemas.openxmlformats.org/presentationml/2006/main">
-  <p:cSld>
-    <p:spTree>
-      <p:nvGrpSpPr>
-        <p:cNvPr id="1" name=""/>
-        <p:cNvGrpSpPr/>
-        <p:nvPr/>
-      </p:nvGrpSpPr>
-      <p:grpSpPr>
-        <a:xfrm>
-          <a:off x="0" y="0"/>
-          <a:ext cx="0" cy="0"/>
-          <a:chOff x="0" y="0"/>
-          <a:chExt cx="0" cy="0"/>
-        </a:xfrm>
-      </p:grpSpPr>
-      <p:sp>
-        <p:nvSpPr>
-          <p:cNvPr id="2" name="Title 1">
-            <a:extLst>
-              <a:ext uri="{FF2B5EF4-FFF2-40B4-BE49-F238E27FC236}">
-                <a16:creationId xmlns:a16="http://schemas.microsoft.com/office/drawing/2014/main" id="{546BB355-4267-F84B-824C-C28906599D9F}"/>
-              </a:ext>
-            </a:extLst>
-          </p:cNvPr>
-          <p:cNvSpPr>
-            <a:spLocks noGrp="1"/>
-          </p:cNvSpPr>
-          <p:nvPr>
-            <p:ph type="title"/>
-          </p:nvPr>
-        </p:nvSpPr>
-        <p:spPr/>
-        <p:txBody>
-          <a:bodyPr/>
-          <a:lstStyle/>
-          <a:p>
-            <a:r>
-              <a:rPr lang="en-US" dirty="0"/>
-              <a:t>Analysing convergence of NTBEA (8-params)</a:t>
-            </a:r>
-          </a:p>
-        </p:txBody>
-      </p:sp>
-      <p:sp>
-        <p:nvSpPr>
-          <p:cNvPr id="3" name="Content Placeholder 2">
-            <a:extLst>
-              <a:ext uri="{FF2B5EF4-FFF2-40B4-BE49-F238E27FC236}">
-                <a16:creationId xmlns:a16="http://schemas.microsoft.com/office/drawing/2014/main" id="{7A7E67C9-D7AC-4F40-933A-E3EAD3620464}"/>
-              </a:ext>
-            </a:extLst>
-          </p:cNvPr>
-          <p:cNvSpPr>
-            <a:spLocks noGrp="1"/>
-          </p:cNvSpPr>
-          <p:nvPr>
-            <p:ph idx="1"/>
-          </p:nvPr>
-        </p:nvSpPr>
-        <p:spPr>
-          <a:xfrm>
-            <a:off x="838200" y="1825625"/>
-            <a:ext cx="3508169" cy="4351338"/>
-          </a:xfrm>
-        </p:spPr>
-        <p:txBody>
-          <a:bodyPr>
-            <a:normAutofit fontScale="85000" lnSpcReduction="20000"/>
-          </a:bodyPr>
-          <a:lstStyle/>
-          <a:p>
-            <a:r>
-              <a:rPr lang="en-US" dirty="0"/>
-              <a:t>This plot is from a game parameter optimisation problem (sample budget 200)</a:t>
-            </a:r>
-          </a:p>
-          <a:p>
-            <a:r>
-              <a:rPr lang="en-US" dirty="0"/>
-              <a:t>It illustrates how the sampling explores options that the algorithm does not consider to be best</a:t>
-            </a:r>
-          </a:p>
-          <a:p>
-            <a:r>
-              <a:rPr lang="en-US" dirty="0"/>
-              <a:t>And also the </a:t>
-            </a:r>
-            <a:r>
-              <a:rPr lang="en-US" b="1" dirty="0"/>
-              <a:t>anytime</a:t>
-            </a:r>
-            <a:r>
-              <a:rPr lang="en-US" dirty="0"/>
-              <a:t> nature of the algorithm</a:t>
-            </a:r>
-          </a:p>
-          <a:p>
-            <a:r>
-              <a:rPr lang="en-US" dirty="0"/>
-              <a:t>Note how the “best” has converged on the final recommendation about 30 iterations in advance</a:t>
-            </a:r>
-          </a:p>
-        </p:txBody>
-      </p:sp>
-      <p:pic>
-        <p:nvPicPr>
-          <p:cNvPr id="4" name="Picture 3">
-            <a:extLst>
-              <a:ext uri="{FF2B5EF4-FFF2-40B4-BE49-F238E27FC236}">
-                <a16:creationId xmlns:a16="http://schemas.microsoft.com/office/drawing/2014/main" id="{EC4E98F5-783A-A943-AD00-BF900E6E50B7}"/>
-              </a:ext>
-            </a:extLst>
-          </p:cNvPr>
-          <p:cNvPicPr>
-            <a:picLocks noChangeAspect="1"/>
-          </p:cNvPicPr>
-          <p:nvPr/>
-        </p:nvPicPr>
-        <p:blipFill>
-          <a:blip r:embed="rId3"/>
-          <a:stretch>
-            <a:fillRect/>
-          </a:stretch>
-        </p:blipFill>
-        <p:spPr>
-          <a:xfrm>
-            <a:off x="5201392" y="2345270"/>
-            <a:ext cx="5271536" cy="3917319"/>
-          </a:xfrm>
-          <a:prstGeom prst="rect">
-            <a:avLst/>
-          </a:prstGeom>
-        </p:spPr>
-      </p:pic>
-      <p:pic>
-        <p:nvPicPr>
-          <p:cNvPr id="5" name="Picture 4">
-            <a:extLst>
-              <a:ext uri="{FF2B5EF4-FFF2-40B4-BE49-F238E27FC236}">
-                <a16:creationId xmlns:a16="http://schemas.microsoft.com/office/drawing/2014/main" id="{EEF789B7-9A53-484E-A564-490F82C43340}"/>
-              </a:ext>
-            </a:extLst>
-          </p:cNvPr>
-          <p:cNvPicPr>
-            <a:picLocks noChangeAspect="1"/>
-          </p:cNvPicPr>
-          <p:nvPr/>
-        </p:nvPicPr>
-        <p:blipFill>
-          <a:blip r:embed="rId4"/>
-          <a:stretch>
-            <a:fillRect/>
-          </a:stretch>
-        </p:blipFill>
-        <p:spPr>
-          <a:xfrm>
-            <a:off x="5201392" y="1541360"/>
-            <a:ext cx="5271536" cy="803909"/>
-          </a:xfrm>
-          <a:prstGeom prst="rect">
-            <a:avLst/>
-          </a:prstGeom>
-        </p:spPr>
-      </p:pic>
-    </p:spTree>
-    <p:extLst>
-      <p:ext uri="{BB962C8B-B14F-4D97-AF65-F5344CB8AC3E}">
-        <p14:creationId xmlns:p14="http://schemas.microsoft.com/office/powerpoint/2010/main" val="3755633186"/>
-      </p:ext>
-    </p:extLst>
-  </p:cSld>
-  <p:clrMapOvr>
-    <a:masterClrMapping/>
-  </p:clrMapOvr>
-</p:sld>
-</file>
-
-<file path=ppt/slides/slide18.xml><?xml version="1.0" encoding="utf-8"?>
-<p:sld xmlns:a="http://schemas.openxmlformats.org/drawingml/2006/main" xmlns:r="http://schemas.openxmlformats.org/officeDocument/2006/relationships" xmlns:p="http://schemas.openxmlformats.org/presentationml/2006/main">
-  <p:cSld>
-    <p:spTree>
-      <p:nvGrpSpPr>
-        <p:cNvPr id="1" name=""/>
-        <p:cNvGrpSpPr/>
-        <p:nvPr/>
-      </p:nvGrpSpPr>
-      <p:grpSpPr>
-        <a:xfrm>
-          <a:off x="0" y="0"/>
-          <a:ext cx="0" cy="0"/>
-          <a:chOff x="0" y="0"/>
-          <a:chExt cx="0" cy="0"/>
-        </a:xfrm>
-      </p:grpSpPr>
-      <p:sp>
-        <p:nvSpPr>
-          <p:cNvPr id="2" name="Title 1">
-            <a:extLst>
-              <a:ext uri="{FF2B5EF4-FFF2-40B4-BE49-F238E27FC236}">
-                <a16:creationId xmlns:a16="http://schemas.microsoft.com/office/drawing/2014/main" id="{FA64DBD2-F320-1849-98C4-90ACCB3CB9F2}"/>
-              </a:ext>
-            </a:extLst>
-          </p:cNvPr>
-          <p:cNvSpPr>
-            <a:spLocks noGrp="1"/>
-          </p:cNvSpPr>
-          <p:nvPr>
-            <p:ph type="title"/>
-          </p:nvPr>
-        </p:nvSpPr>
-        <p:spPr/>
-        <p:txBody>
-          <a:bodyPr/>
-          <a:lstStyle/>
-          <a:p>
-            <a:r>
-              <a:rPr lang="en-US" dirty="0"/>
-              <a:t>Conclusions </a:t>
-            </a:r>
-          </a:p>
-        </p:txBody>
-      </p:sp>
-      <p:sp>
-        <p:nvSpPr>
-          <p:cNvPr id="3" name="Content Placeholder 2">
-            <a:extLst>
-              <a:ext uri="{FF2B5EF4-FFF2-40B4-BE49-F238E27FC236}">
-                <a16:creationId xmlns:a16="http://schemas.microsoft.com/office/drawing/2014/main" id="{1726BC6D-2FC7-0F48-8DBF-4326A15468EA}"/>
-              </a:ext>
-            </a:extLst>
-          </p:cNvPr>
-          <p:cNvSpPr>
-            <a:spLocks noGrp="1"/>
-          </p:cNvSpPr>
-          <p:nvPr>
-            <p:ph idx="1"/>
-          </p:nvPr>
-        </p:nvSpPr>
-        <p:spPr/>
-        <p:txBody>
-          <a:bodyPr>
-            <a:normAutofit fontScale="92500" lnSpcReduction="20000"/>
-          </a:bodyPr>
-          <a:lstStyle/>
-          <a:p>
-            <a:r>
-              <a:rPr lang="en-US" dirty="0"/>
-              <a:t>New game with significant skill depth</a:t>
-            </a:r>
-          </a:p>
-          <a:p>
-            <a:pPr lvl="1"/>
-            <a:r>
-              <a:rPr lang="en-US" dirty="0"/>
-              <a:t>Evidenced by wide performance variations between the agents</a:t>
-            </a:r>
-          </a:p>
-          <a:p>
-            <a:r>
-              <a:rPr lang="en-US" dirty="0"/>
-              <a:t>Importance of parameter tuning clearly demonstrated</a:t>
-            </a:r>
-          </a:p>
-          <a:p>
-            <a:pPr lvl="1"/>
-            <a:r>
-              <a:rPr lang="en-US" dirty="0"/>
-              <a:t>Well tuned RHEA agents hugely outperformed poorly tuned ones</a:t>
-            </a:r>
-          </a:p>
-          <a:p>
-            <a:r>
-              <a:rPr lang="en-US" dirty="0"/>
-              <a:t>Tests were run with restricted sample budget (only 288 fitness evaluations per </a:t>
-            </a:r>
-            <a:r>
-              <a:rPr lang="en-US" dirty="0" err="1"/>
-              <a:t>optimisation</a:t>
-            </a:r>
-            <a:r>
-              <a:rPr lang="en-US" dirty="0"/>
-              <a:t> run)</a:t>
-            </a:r>
-          </a:p>
-          <a:p>
-            <a:r>
-              <a:rPr lang="en-US" dirty="0"/>
-              <a:t>Model-based clearly performed best</a:t>
-            </a:r>
-          </a:p>
-          <a:p>
-            <a:r>
-              <a:rPr lang="en-US" dirty="0"/>
-              <a:t>NTBEA is especially simple and informative</a:t>
-            </a:r>
-          </a:p>
-          <a:p>
-            <a:pPr lvl="1"/>
-            <a:r>
-              <a:rPr lang="en-US" dirty="0"/>
-              <a:t>We learned that high mutation rates work surprisingly well</a:t>
-            </a:r>
-          </a:p>
-          <a:p>
-            <a:r>
-              <a:rPr lang="en-US" dirty="0"/>
-              <a:t>Currently only works with discrete / discretized parameters</a:t>
-            </a:r>
-          </a:p>
-          <a:p>
-            <a:pPr lvl="1"/>
-            <a:r>
-              <a:rPr lang="en-US" dirty="0"/>
-              <a:t>Future work will add continuous parameters</a:t>
-            </a:r>
-          </a:p>
-          <a:p>
-            <a:pPr lvl="1"/>
-            <a:r>
-              <a:rPr lang="en-US" dirty="0"/>
-              <a:t>And also tree-structured </a:t>
-            </a:r>
-            <a:r>
-              <a:rPr lang="en-US" dirty="0" err="1"/>
-              <a:t>parameterisation</a:t>
-            </a:r>
-            <a:endParaRPr lang="en-US" dirty="0"/>
-          </a:p>
-        </p:txBody>
-      </p:sp>
-    </p:spTree>
-    <p:extLst>
-      <p:ext uri="{BB962C8B-B14F-4D97-AF65-F5344CB8AC3E}">
-        <p14:creationId xmlns:p14="http://schemas.microsoft.com/office/powerpoint/2010/main" val="2757433156"/>
-      </p:ext>
-    </p:extLst>
-  </p:cSld>
-  <p:clrMapOvr>
-    <a:masterClrMapping/>
-  </p:clrMapOvr>
-</p:sld>
-</file>
-
-<file path=ppt/slides/slide2.xml><?xml version="1.0" encoding="utf-8"?>
-<p:sld xmlns:a="http://schemas.openxmlformats.org/drawingml/2006/main" xmlns:r="http://schemas.openxmlformats.org/officeDocument/2006/relationships" xmlns:p="http://schemas.openxmlformats.org/presentationml/2006/main">
-  <p:cSld>
-    <p:spTree>
-      <p:nvGrpSpPr>
-        <p:cNvPr id="1" name=""/>
-        <p:cNvGrpSpPr/>
-        <p:nvPr/>
-      </p:nvGrpSpPr>
-      <p:grpSpPr>
-        <a:xfrm>
-          <a:off x="0" y="0"/>
-          <a:ext cx="0" cy="0"/>
-          <a:chOff x="0" y="0"/>
-          <a:chExt cx="0" cy="0"/>
-        </a:xfrm>
-      </p:grpSpPr>
-      <p:sp>
-        <p:nvSpPr>
-          <p:cNvPr id="2" name="Title 1">
-            <a:extLst>
-              <a:ext uri="{FF2B5EF4-FFF2-40B4-BE49-F238E27FC236}">
-                <a16:creationId xmlns:a16="http://schemas.microsoft.com/office/drawing/2014/main" id="{B355399C-EBA8-2D4E-BC36-813152B7F80E}"/>
-              </a:ext>
-            </a:extLst>
-          </p:cNvPr>
-          <p:cNvSpPr>
-            <a:spLocks noGrp="1"/>
-          </p:cNvSpPr>
-          <p:nvPr>
-            <p:ph type="title"/>
-          </p:nvPr>
-        </p:nvSpPr>
-        <p:spPr/>
-        <p:txBody>
-          <a:bodyPr/>
-          <a:lstStyle/>
-          <a:p>
-            <a:r>
-              <a:rPr lang="en-US" dirty="0"/>
-              <a:t>Motivation</a:t>
-            </a:r>
-          </a:p>
-        </p:txBody>
-      </p:sp>
-      <p:sp>
-        <p:nvSpPr>
-          <p:cNvPr id="3" name="Content Placeholder 2">
-            <a:extLst>
-              <a:ext uri="{FF2B5EF4-FFF2-40B4-BE49-F238E27FC236}">
-                <a16:creationId xmlns:a16="http://schemas.microsoft.com/office/drawing/2014/main" id="{B6481C69-98B4-4543-868C-0A13710DC9BF}"/>
-              </a:ext>
-            </a:extLst>
-          </p:cNvPr>
-          <p:cNvSpPr>
-            <a:spLocks noGrp="1"/>
-          </p:cNvSpPr>
-          <p:nvPr>
-            <p:ph idx="1"/>
-          </p:nvPr>
-        </p:nvSpPr>
-        <p:spPr/>
-        <p:txBody>
-          <a:bodyPr>
-            <a:normAutofit lnSpcReduction="10000"/>
-          </a:bodyPr>
-          <a:lstStyle/>
-          <a:p>
-            <a:r>
-              <a:rPr lang="en-US" sz="3600" dirty="0"/>
-              <a:t>Emphasize importance of parameter tuning in game AI</a:t>
-            </a:r>
-          </a:p>
-          <a:p>
-            <a:pPr lvl="1"/>
-            <a:r>
-              <a:rPr lang="en-US" sz="3200" dirty="0"/>
-              <a:t>And evaluate which methods work best</a:t>
-            </a:r>
-          </a:p>
-          <a:p>
-            <a:r>
-              <a:rPr lang="en-US" sz="3600" dirty="0"/>
-              <a:t>Best seen as a </a:t>
-            </a:r>
-            <a:r>
-              <a:rPr lang="en-US" sz="3600" b="1" dirty="0"/>
-              <a:t>NOISY</a:t>
-            </a:r>
-            <a:r>
-              <a:rPr lang="en-US" sz="3600" dirty="0"/>
-              <a:t> optimisation problem</a:t>
-            </a:r>
-          </a:p>
-          <a:p>
-            <a:pPr lvl="1"/>
-            <a:r>
-              <a:rPr lang="en-US" sz="3200" dirty="0"/>
-              <a:t>Stochastic games</a:t>
-            </a:r>
-          </a:p>
-          <a:p>
-            <a:pPr lvl="1"/>
-            <a:r>
-              <a:rPr lang="en-US" sz="3200" dirty="0"/>
-              <a:t>Stochastic agents</a:t>
-            </a:r>
-          </a:p>
-          <a:p>
-            <a:r>
-              <a:rPr lang="en-US" sz="3600" dirty="0"/>
-              <a:t>Develop additional games for testing AI agents</a:t>
-            </a:r>
-          </a:p>
-          <a:p>
-            <a:pPr lvl="1"/>
-            <a:r>
-              <a:rPr lang="en-US" sz="3200" dirty="0"/>
-              <a:t>Make them efficient to enable rapid experimentation without requiring heavy CPU/GPU resource (more energy-efficient also)</a:t>
-            </a:r>
-          </a:p>
-        </p:txBody>
-      </p:sp>
-    </p:spTree>
-    <p:extLst>
-      <p:ext uri="{BB962C8B-B14F-4D97-AF65-F5344CB8AC3E}">
-        <p14:creationId xmlns:p14="http://schemas.microsoft.com/office/powerpoint/2010/main" val="246028498"/>
-      </p:ext>
-    </p:extLst>
-  </p:cSld>
-  <p:clrMapOvr>
-    <a:masterClrMapping/>
-  </p:clrMapOvr>
-</p:sld>
-</file>
-
-<file path=ppt/slides/slide3.xml><?xml version="1.0" encoding="utf-8"?>
-<p:sld xmlns:a="http://schemas.openxmlformats.org/drawingml/2006/main" xmlns:r="http://schemas.openxmlformats.org/officeDocument/2006/relationships" xmlns:p="http://schemas.openxmlformats.org/presentationml/2006/main">
-  <p:cSld>
-    <p:spTree>
-      <p:nvGrpSpPr>
-        <p:cNvPr id="1" name=""/>
-        <p:cNvGrpSpPr/>
-        <p:nvPr/>
-      </p:nvGrpSpPr>
-      <p:grpSpPr>
-        <a:xfrm>
-          <a:off x="0" y="0"/>
-          <a:ext cx="0" cy="0"/>
-          <a:chOff x="0" y="0"/>
-          <a:chExt cx="0" cy="0"/>
-        </a:xfrm>
-      </p:grpSpPr>
-      <p:sp>
-        <p:nvSpPr>
-          <p:cNvPr id="2" name="Title 1"/>
-          <p:cNvSpPr>
-            <a:spLocks noGrp="1"/>
-          </p:cNvSpPr>
-          <p:nvPr>
-            <p:ph type="title"/>
-          </p:nvPr>
-        </p:nvSpPr>
-        <p:spPr>
-          <a:xfrm>
-            <a:off x="2152650" y="394636"/>
-            <a:ext cx="7886700" cy="1386642"/>
-          </a:xfrm>
-        </p:spPr>
-        <p:txBody>
-          <a:bodyPr>
-            <a:normAutofit/>
-          </a:bodyPr>
-          <a:lstStyle/>
-          <a:p>
-            <a:r>
-              <a:rPr lang="en-US" dirty="0"/>
-              <a:t>Hyper-Parameter Optimisation: Considerations</a:t>
-            </a:r>
-          </a:p>
-        </p:txBody>
-      </p:sp>
-      <p:sp>
-        <p:nvSpPr>
-          <p:cNvPr id="3" name="Content Placeholder 2"/>
-          <p:cNvSpPr>
-            <a:spLocks noGrp="1"/>
-          </p:cNvSpPr>
-          <p:nvPr>
-            <p:ph idx="1"/>
-          </p:nvPr>
-        </p:nvSpPr>
-        <p:spPr>
-          <a:xfrm>
-            <a:off x="2152650" y="1839029"/>
-            <a:ext cx="7886700" cy="4571396"/>
-          </a:xfrm>
-        </p:spPr>
-        <p:txBody>
-          <a:bodyPr>
-            <a:normAutofit fontScale="70000" lnSpcReduction="20000"/>
-          </a:bodyPr>
-          <a:lstStyle/>
-          <a:p>
-            <a:r>
-              <a:rPr lang="en-US" dirty="0"/>
-              <a:t>Parameter types:</a:t>
-            </a:r>
-          </a:p>
-          <a:p>
-            <a:pPr lvl="1"/>
-            <a:r>
-              <a:rPr lang="en-US" dirty="0"/>
-              <a:t>Continuous, discrete, categorical</a:t>
-            </a:r>
-          </a:p>
-          <a:p>
-            <a:pPr lvl="1"/>
-            <a:r>
-              <a:rPr lang="en-US" dirty="0"/>
-              <a:t>Flat versus tree structured / conditional</a:t>
-            </a:r>
-          </a:p>
-          <a:p>
-            <a:r>
-              <a:rPr lang="en-US" dirty="0"/>
-              <a:t>Robustness to Noise levels</a:t>
-            </a:r>
-          </a:p>
-          <a:p>
-            <a:pPr lvl="1"/>
-            <a:r>
-              <a:rPr lang="en-US" dirty="0"/>
-              <a:t>From low to high, known versus unknown distributions</a:t>
-            </a:r>
-          </a:p>
-          <a:p>
-            <a:r>
-              <a:rPr lang="en-US" dirty="0"/>
-              <a:t>Efficiency</a:t>
-            </a:r>
-          </a:p>
-          <a:p>
-            <a:pPr lvl="1"/>
-            <a:r>
-              <a:rPr lang="en-US" dirty="0"/>
-              <a:t>Space and time</a:t>
-            </a:r>
-          </a:p>
-          <a:p>
-            <a:pPr lvl="1"/>
-            <a:r>
-              <a:rPr lang="en-US" dirty="0"/>
-              <a:t>Depending on number of samples (fitness evaluations), number of parameters / size of search space</a:t>
-            </a:r>
-          </a:p>
-          <a:p>
-            <a:r>
-              <a:rPr lang="en-US" dirty="0"/>
-              <a:t>Simplicity</a:t>
-            </a:r>
-          </a:p>
-          <a:p>
-            <a:r>
-              <a:rPr lang="en-US" dirty="0"/>
-              <a:t>Interpretability: how informative is the model?</a:t>
-            </a:r>
-          </a:p>
-          <a:p>
-            <a:r>
-              <a:rPr lang="en-US" dirty="0"/>
-              <a:t>System being optimised:</a:t>
-            </a:r>
-          </a:p>
-          <a:p>
-            <a:pPr lvl="1"/>
-            <a:r>
-              <a:rPr lang="en-US" b="1" dirty="0"/>
-              <a:t>Black-box</a:t>
-            </a:r>
-            <a:r>
-              <a:rPr lang="en-US" dirty="0"/>
-              <a:t>, grey-box, white-box (especially important is parameter sharing)</a:t>
-            </a:r>
-          </a:p>
-          <a:p>
-            <a:pPr lvl="1"/>
-            <a:r>
-              <a:rPr lang="en-US" dirty="0"/>
-              <a:t>Is </a:t>
-            </a:r>
-            <a:r>
-              <a:rPr lang="en-US" b="1" dirty="0"/>
-              <a:t>Early Stopping / Anytime</a:t>
-            </a:r>
-            <a:r>
-              <a:rPr lang="en-US" dirty="0"/>
-              <a:t> possible?</a:t>
-            </a:r>
-          </a:p>
-          <a:p>
-            <a:r>
-              <a:rPr lang="en-US" dirty="0"/>
-              <a:t>Available software (simplicity of APIs and operability)</a:t>
-            </a:r>
-          </a:p>
-          <a:p>
-            <a:endParaRPr lang="en-US" dirty="0"/>
-          </a:p>
-        </p:txBody>
-      </p:sp>
-    </p:spTree>
-    <p:extLst>
-      <p:ext uri="{BB962C8B-B14F-4D97-AF65-F5344CB8AC3E}">
-        <p14:creationId xmlns:p14="http://schemas.microsoft.com/office/powerpoint/2010/main" val="1464126142"/>
-      </p:ext>
-    </p:extLst>
-  </p:cSld>
-  <p:clrMapOvr>
-    <a:masterClrMapping/>
-  </p:clrMapOvr>
-</p:sld>
-</file>
-
-<file path=ppt/slides/slide4.xml><?xml version="1.0" encoding="utf-8"?>
-<p:sld xmlns:a="http://schemas.openxmlformats.org/drawingml/2006/main" xmlns:r="http://schemas.openxmlformats.org/officeDocument/2006/relationships" xmlns:p="http://schemas.openxmlformats.org/presentationml/2006/main">
-  <p:cSld>
-    <p:spTree>
-      <p:nvGrpSpPr>
-        <p:cNvPr id="1" name=""/>
-        <p:cNvGrpSpPr/>
-        <p:nvPr/>
-      </p:nvGrpSpPr>
-      <p:grpSpPr>
-        <a:xfrm>
-          <a:off x="0" y="0"/>
-          <a:ext cx="0" cy="0"/>
-          <a:chOff x="0" y="0"/>
-          <a:chExt cx="0" cy="0"/>
-        </a:xfrm>
-      </p:grpSpPr>
-      <p:sp>
-        <p:nvSpPr>
-          <p:cNvPr id="2" name="Title 1">
-            <a:extLst>
-              <a:ext uri="{FF2B5EF4-FFF2-40B4-BE49-F238E27FC236}">
                 <a16:creationId xmlns:a16="http://schemas.microsoft.com/office/drawing/2014/main" id="{297AED7C-E42B-F446-8560-A659CD4E212F}"/>
               </a:ext>
             </a:extLst>
@@ -6363,7 +4819,7 @@
 </p:sld>
 </file>
 
-<file path=ppt/slides/slide5.xml><?xml version="1.0" encoding="utf-8"?>
+<file path=ppt/slides/slide11.xml><?xml version="1.0" encoding="utf-8"?>
 <p:sld xmlns:a="http://schemas.openxmlformats.org/drawingml/2006/main" xmlns:r="http://schemas.openxmlformats.org/officeDocument/2006/relationships" xmlns:p="http://schemas.openxmlformats.org/presentationml/2006/main">
   <p:cSld>
     <p:spTree>
@@ -6784,7 +5240,7 @@
 </p:sld>
 </file>
 
-<file path=ppt/slides/slide6.xml><?xml version="1.0" encoding="utf-8"?>
+<file path=ppt/slides/slide12.xml><?xml version="1.0" encoding="utf-8"?>
 <p:sld xmlns:a="http://schemas.openxmlformats.org/drawingml/2006/main" xmlns:r="http://schemas.openxmlformats.org/officeDocument/2006/relationships" xmlns:p="http://schemas.openxmlformats.org/presentationml/2006/main">
   <p:cSld>
     <p:spTree>
@@ -6900,7 +5356,7 @@
 </p:sld>
 </file>
 
-<file path=ppt/slides/slide7.xml><?xml version="1.0" encoding="utf-8"?>
+<file path=ppt/slides/slide13.xml><?xml version="1.0" encoding="utf-8"?>
 <p:sld xmlns:a="http://schemas.openxmlformats.org/drawingml/2006/main" xmlns:r="http://schemas.openxmlformats.org/officeDocument/2006/relationships" xmlns:p="http://schemas.openxmlformats.org/presentationml/2006/main">
   <p:cSld>
     <p:spTree>
@@ -7261,7 +5717,7 @@
 </p:sld>
 </file>
 
-<file path=ppt/slides/slide8.xml><?xml version="1.0" encoding="utf-8"?>
+<file path=ppt/slides/slide14.xml><?xml version="1.0" encoding="utf-8"?>
 <p:sld xmlns:a="http://schemas.openxmlformats.org/drawingml/2006/main" xmlns:r="http://schemas.openxmlformats.org/officeDocument/2006/relationships" xmlns:p="http://schemas.openxmlformats.org/presentationml/2006/main">
   <p:cSld>
     <p:spTree>
@@ -7447,6 +5903,2580 @@
     <p:extLst>
       <p:ext uri="{BB962C8B-B14F-4D97-AF65-F5344CB8AC3E}">
         <p14:creationId xmlns:p14="http://schemas.microsoft.com/office/powerpoint/2010/main" val="2899925096"/>
+      </p:ext>
+    </p:extLst>
+  </p:cSld>
+  <p:clrMapOvr>
+    <a:masterClrMapping/>
+  </p:clrMapOvr>
+</p:sld>
+</file>
+
+<file path=ppt/slides/slide15.xml><?xml version="1.0" encoding="utf-8"?>
+<p:sld xmlns:a="http://schemas.openxmlformats.org/drawingml/2006/main" xmlns:r="http://schemas.openxmlformats.org/officeDocument/2006/relationships" xmlns:p="http://schemas.openxmlformats.org/presentationml/2006/main">
+  <p:cSld>
+    <p:spTree>
+      <p:nvGrpSpPr>
+        <p:cNvPr id="1" name=""/>
+        <p:cNvGrpSpPr/>
+        <p:nvPr/>
+      </p:nvGrpSpPr>
+      <p:grpSpPr>
+        <a:xfrm>
+          <a:off x="0" y="0"/>
+          <a:ext cx="0" cy="0"/>
+          <a:chOff x="0" y="0"/>
+          <a:chExt cx="0" cy="0"/>
+        </a:xfrm>
+      </p:grpSpPr>
+      <p:sp>
+        <p:nvSpPr>
+          <p:cNvPr id="2" name="Title 1">
+            <a:extLst>
+              <a:ext uri="{FF2B5EF4-FFF2-40B4-BE49-F238E27FC236}">
+                <a16:creationId xmlns:a16="http://schemas.microsoft.com/office/drawing/2014/main" id="{B128E0D2-9165-494E-AAAE-30EE0B72A00E}"/>
+              </a:ext>
+            </a:extLst>
+          </p:cNvPr>
+          <p:cNvSpPr>
+            <a:spLocks noGrp="1"/>
+          </p:cNvSpPr>
+          <p:nvPr>
+            <p:ph type="title"/>
+          </p:nvPr>
+        </p:nvSpPr>
+        <p:spPr/>
+        <p:txBody>
+          <a:bodyPr>
+            <a:normAutofit fontScale="90000"/>
+          </a:bodyPr>
+          <a:lstStyle/>
+          <a:p>
+            <a:r>
+              <a:rPr lang="en-GB" dirty="0"/>
+              <a:t>Green bars: exploitation</a:t>
+            </a:r>
+            <a:br>
+              <a:rPr lang="en-GB" dirty="0"/>
+            </a:br>
+            <a:r>
+              <a:rPr lang="en-GB" dirty="0"/>
+              <a:t>Blue bars: exploration</a:t>
+            </a:r>
+            <a:br>
+              <a:rPr lang="en-GB" dirty="0"/>
+            </a:br>
+            <a:r>
+              <a:rPr lang="en-GB" dirty="0"/>
+              <a:t>Green + Blue = UCB value</a:t>
+            </a:r>
+            <a:endParaRPr lang="en-US" dirty="0"/>
+          </a:p>
+        </p:txBody>
+      </p:sp>
+      <p:pic>
+        <p:nvPicPr>
+          <p:cNvPr id="5" name="Content Placeholder 4">
+            <a:extLst>
+              <a:ext uri="{FF2B5EF4-FFF2-40B4-BE49-F238E27FC236}">
+                <a16:creationId xmlns:a16="http://schemas.microsoft.com/office/drawing/2014/main" id="{CD9C1939-F6F6-894B-A5FD-5EF0CBDD38D9}"/>
+              </a:ext>
+            </a:extLst>
+          </p:cNvPr>
+          <p:cNvPicPr>
+            <a:picLocks noGrp="1" noChangeAspect="1"/>
+          </p:cNvPicPr>
+          <p:nvPr>
+            <p:ph idx="1"/>
+          </p:nvPr>
+        </p:nvPicPr>
+        <p:blipFill>
+          <a:blip r:embed="rId3"/>
+          <a:stretch>
+            <a:fillRect/>
+          </a:stretch>
+        </p:blipFill>
+        <p:spPr>
+          <a:xfrm>
+            <a:off x="2720773" y="1825625"/>
+            <a:ext cx="6750454" cy="4351338"/>
+          </a:xfrm>
+        </p:spPr>
+      </p:pic>
+    </p:spTree>
+    <p:extLst>
+      <p:ext uri="{BB962C8B-B14F-4D97-AF65-F5344CB8AC3E}">
+        <p14:creationId xmlns:p14="http://schemas.microsoft.com/office/powerpoint/2010/main" val="2113553676"/>
+      </p:ext>
+    </p:extLst>
+  </p:cSld>
+  <p:clrMapOvr>
+    <a:masterClrMapping/>
+  </p:clrMapOvr>
+</p:sld>
+</file>
+
+<file path=ppt/slides/slide16.xml><?xml version="1.0" encoding="utf-8"?>
+<p:sld xmlns:a="http://schemas.openxmlformats.org/drawingml/2006/main" xmlns:r="http://schemas.openxmlformats.org/officeDocument/2006/relationships" xmlns:p="http://schemas.openxmlformats.org/presentationml/2006/main">
+  <p:cSld>
+    <p:spTree>
+      <p:nvGrpSpPr>
+        <p:cNvPr id="1" name=""/>
+        <p:cNvGrpSpPr/>
+        <p:nvPr/>
+      </p:nvGrpSpPr>
+      <p:grpSpPr>
+        <a:xfrm>
+          <a:off x="0" y="0"/>
+          <a:ext cx="0" cy="0"/>
+          <a:chOff x="0" y="0"/>
+          <a:chExt cx="0" cy="0"/>
+        </a:xfrm>
+      </p:grpSpPr>
+      <p:sp>
+        <p:nvSpPr>
+          <p:cNvPr id="2" name="Title 1">
+            <a:extLst>
+              <a:ext uri="{FF2B5EF4-FFF2-40B4-BE49-F238E27FC236}">
+                <a16:creationId xmlns:a16="http://schemas.microsoft.com/office/drawing/2014/main" id="{22D87973-71D4-3743-8196-1E879BCCD0DB}"/>
+              </a:ext>
+            </a:extLst>
+          </p:cNvPr>
+          <p:cNvSpPr>
+            <a:spLocks noGrp="1"/>
+          </p:cNvSpPr>
+          <p:nvPr>
+            <p:ph type="title"/>
+          </p:nvPr>
+        </p:nvSpPr>
+        <p:spPr/>
+        <p:txBody>
+          <a:bodyPr/>
+          <a:lstStyle/>
+          <a:p>
+            <a:r>
+              <a:rPr lang="en-GB" dirty="0"/>
+              <a:t>Note how exploration term grows for less sampled options</a:t>
+            </a:r>
+            <a:endParaRPr lang="en-US" dirty="0"/>
+          </a:p>
+        </p:txBody>
+      </p:sp>
+      <p:pic>
+        <p:nvPicPr>
+          <p:cNvPr id="11" name="Content Placeholder 10">
+            <a:extLst>
+              <a:ext uri="{FF2B5EF4-FFF2-40B4-BE49-F238E27FC236}">
+                <a16:creationId xmlns:a16="http://schemas.microsoft.com/office/drawing/2014/main" id="{8ECA68DD-32CF-304A-9A1F-5814BAF5F23F}"/>
+              </a:ext>
+            </a:extLst>
+          </p:cNvPr>
+          <p:cNvPicPr>
+            <a:picLocks noGrp="1" noChangeAspect="1"/>
+          </p:cNvPicPr>
+          <p:nvPr>
+            <p:ph idx="1"/>
+          </p:nvPr>
+        </p:nvPicPr>
+        <p:blipFill>
+          <a:blip r:embed="rId2"/>
+          <a:stretch>
+            <a:fillRect/>
+          </a:stretch>
+        </p:blipFill>
+        <p:spPr>
+          <a:xfrm>
+            <a:off x="2736799" y="1825625"/>
+            <a:ext cx="6718403" cy="4351338"/>
+          </a:xfrm>
+        </p:spPr>
+      </p:pic>
+    </p:spTree>
+    <p:extLst>
+      <p:ext uri="{BB962C8B-B14F-4D97-AF65-F5344CB8AC3E}">
+        <p14:creationId xmlns:p14="http://schemas.microsoft.com/office/powerpoint/2010/main" val="3629898845"/>
+      </p:ext>
+    </p:extLst>
+  </p:cSld>
+  <p:clrMapOvr>
+    <a:masterClrMapping/>
+  </p:clrMapOvr>
+</p:sld>
+</file>
+
+<file path=ppt/slides/slide17.xml><?xml version="1.0" encoding="utf-8"?>
+<p:sld xmlns:a="http://schemas.openxmlformats.org/drawingml/2006/main" xmlns:r="http://schemas.openxmlformats.org/officeDocument/2006/relationships" xmlns:p="http://schemas.openxmlformats.org/presentationml/2006/main">
+  <p:cSld>
+    <p:spTree>
+      <p:nvGrpSpPr>
+        <p:cNvPr id="1" name=""/>
+        <p:cNvGrpSpPr/>
+        <p:nvPr/>
+      </p:nvGrpSpPr>
+      <p:grpSpPr>
+        <a:xfrm>
+          <a:off x="0" y="0"/>
+          <a:ext cx="0" cy="0"/>
+          <a:chOff x="0" y="0"/>
+          <a:chExt cx="0" cy="0"/>
+        </a:xfrm>
+      </p:grpSpPr>
+      <p:sp>
+        <p:nvSpPr>
+          <p:cNvPr id="2" name="Title 1">
+            <a:extLst>
+              <a:ext uri="{FF2B5EF4-FFF2-40B4-BE49-F238E27FC236}">
+                <a16:creationId xmlns:a16="http://schemas.microsoft.com/office/drawing/2014/main" id="{982D53F3-643C-D048-9B6B-94E591237721}"/>
+              </a:ext>
+            </a:extLst>
+          </p:cNvPr>
+          <p:cNvSpPr>
+            <a:spLocks noGrp="1"/>
+          </p:cNvSpPr>
+          <p:nvPr>
+            <p:ph type="title"/>
+          </p:nvPr>
+        </p:nvSpPr>
+        <p:spPr/>
+        <p:txBody>
+          <a:bodyPr/>
+          <a:lstStyle/>
+          <a:p>
+            <a:r>
+              <a:rPr lang="en-GB" dirty="0"/>
+              <a:t>Note how promising options are sampled more frequently</a:t>
+            </a:r>
+            <a:endParaRPr lang="en-US" dirty="0"/>
+          </a:p>
+        </p:txBody>
+      </p:sp>
+      <p:pic>
+        <p:nvPicPr>
+          <p:cNvPr id="11" name="Content Placeholder 10">
+            <a:extLst>
+              <a:ext uri="{FF2B5EF4-FFF2-40B4-BE49-F238E27FC236}">
+                <a16:creationId xmlns:a16="http://schemas.microsoft.com/office/drawing/2014/main" id="{93F47FCC-4917-594C-B55D-EFE06A7E1A40}"/>
+              </a:ext>
+            </a:extLst>
+          </p:cNvPr>
+          <p:cNvPicPr>
+            <a:picLocks noGrp="1" noChangeAspect="1"/>
+          </p:cNvPicPr>
+          <p:nvPr>
+            <p:ph idx="1"/>
+          </p:nvPr>
+        </p:nvPicPr>
+        <p:blipFill>
+          <a:blip r:embed="rId2"/>
+          <a:stretch>
+            <a:fillRect/>
+          </a:stretch>
+        </p:blipFill>
+        <p:spPr>
+          <a:xfrm>
+            <a:off x="2732172" y="1825625"/>
+            <a:ext cx="6727656" cy="4351338"/>
+          </a:xfrm>
+        </p:spPr>
+      </p:pic>
+    </p:spTree>
+    <p:extLst>
+      <p:ext uri="{BB962C8B-B14F-4D97-AF65-F5344CB8AC3E}">
+        <p14:creationId xmlns:p14="http://schemas.microsoft.com/office/powerpoint/2010/main" val="2448134660"/>
+      </p:ext>
+    </p:extLst>
+  </p:cSld>
+  <p:clrMapOvr>
+    <a:masterClrMapping/>
+  </p:clrMapOvr>
+</p:sld>
+</file>
+
+<file path=ppt/slides/slide18.xml><?xml version="1.0" encoding="utf-8"?>
+<p:sld xmlns:a="http://schemas.openxmlformats.org/drawingml/2006/main" xmlns:r="http://schemas.openxmlformats.org/officeDocument/2006/relationships" xmlns:p="http://schemas.openxmlformats.org/presentationml/2006/main">
+  <p:cSld>
+    <p:spTree>
+      <p:nvGrpSpPr>
+        <p:cNvPr id="1" name=""/>
+        <p:cNvGrpSpPr/>
+        <p:nvPr/>
+      </p:nvGrpSpPr>
+      <p:grpSpPr>
+        <a:xfrm>
+          <a:off x="0" y="0"/>
+          <a:ext cx="0" cy="0"/>
+          <a:chOff x="0" y="0"/>
+          <a:chExt cx="0" cy="0"/>
+        </a:xfrm>
+      </p:grpSpPr>
+      <p:sp>
+        <p:nvSpPr>
+          <p:cNvPr id="2" name="Title 1">
+            <a:extLst>
+              <a:ext uri="{FF2B5EF4-FFF2-40B4-BE49-F238E27FC236}">
+                <a16:creationId xmlns:a16="http://schemas.microsoft.com/office/drawing/2014/main" id="{C9794518-1665-144A-83C6-852D52E90D93}"/>
+              </a:ext>
+            </a:extLst>
+          </p:cNvPr>
+          <p:cNvSpPr>
+            <a:spLocks noGrp="1"/>
+          </p:cNvSpPr>
+          <p:nvPr>
+            <p:ph type="title"/>
+          </p:nvPr>
+        </p:nvSpPr>
+        <p:spPr/>
+        <p:txBody>
+          <a:bodyPr/>
+          <a:lstStyle/>
+          <a:p>
+            <a:r>
+              <a:rPr lang="en-GB" dirty="0"/>
+              <a:t>So far, that’s fine for a single parameter</a:t>
+            </a:r>
+            <a:endParaRPr lang="en-US" dirty="0"/>
+          </a:p>
+        </p:txBody>
+      </p:sp>
+      <p:sp>
+        <p:nvSpPr>
+          <p:cNvPr id="3" name="Content Placeholder 2">
+            <a:extLst>
+              <a:ext uri="{FF2B5EF4-FFF2-40B4-BE49-F238E27FC236}">
+                <a16:creationId xmlns:a16="http://schemas.microsoft.com/office/drawing/2014/main" id="{9FFBCA1E-0520-1641-BCAA-503A575FBB8C}"/>
+              </a:ext>
+            </a:extLst>
+          </p:cNvPr>
+          <p:cNvSpPr>
+            <a:spLocks noGrp="1"/>
+          </p:cNvSpPr>
+          <p:nvPr>
+            <p:ph idx="1"/>
+          </p:nvPr>
+        </p:nvSpPr>
+        <p:spPr/>
+        <p:txBody>
+          <a:bodyPr/>
+          <a:lstStyle/>
+          <a:p>
+            <a:r>
+              <a:rPr lang="en-GB" dirty="0"/>
+              <a:t>But we need to choose the best </a:t>
+            </a:r>
+            <a:r>
+              <a:rPr lang="en-GB" sz="9600" dirty="0"/>
+              <a:t>COMBINATION</a:t>
+            </a:r>
+            <a:r>
+              <a:rPr lang="en-GB" dirty="0"/>
+              <a:t> of parameters!</a:t>
+            </a:r>
+          </a:p>
+          <a:p>
+            <a:r>
+              <a:rPr lang="en-GB" dirty="0"/>
+              <a:t>Hence the N-Tuple model</a:t>
+            </a:r>
+          </a:p>
+          <a:p>
+            <a:r>
+              <a:rPr lang="en-GB" dirty="0"/>
+              <a:t>Scales well for a large number of parameters</a:t>
+            </a:r>
+            <a:endParaRPr lang="en-US" dirty="0"/>
+          </a:p>
+        </p:txBody>
+      </p:sp>
+    </p:spTree>
+    <p:extLst>
+      <p:ext uri="{BB962C8B-B14F-4D97-AF65-F5344CB8AC3E}">
+        <p14:creationId xmlns:p14="http://schemas.microsoft.com/office/powerpoint/2010/main" val="1276659026"/>
+      </p:ext>
+    </p:extLst>
+  </p:cSld>
+  <p:clrMapOvr>
+    <a:masterClrMapping/>
+  </p:clrMapOvr>
+</p:sld>
+</file>
+
+<file path=ppt/slides/slide19.xml><?xml version="1.0" encoding="utf-8"?>
+<p:sld xmlns:a="http://schemas.openxmlformats.org/drawingml/2006/main" xmlns:r="http://schemas.openxmlformats.org/officeDocument/2006/relationships" xmlns:p="http://schemas.openxmlformats.org/presentationml/2006/main">
+  <p:cSld>
+    <p:spTree>
+      <p:nvGrpSpPr>
+        <p:cNvPr id="1" name=""/>
+        <p:cNvGrpSpPr/>
+        <p:nvPr/>
+      </p:nvGrpSpPr>
+      <p:grpSpPr>
+        <a:xfrm>
+          <a:off x="0" y="0"/>
+          <a:ext cx="0" cy="0"/>
+          <a:chOff x="0" y="0"/>
+          <a:chExt cx="0" cy="0"/>
+        </a:xfrm>
+      </p:grpSpPr>
+      <p:sp>
+        <p:nvSpPr>
+          <p:cNvPr id="2" name="Title 1">
+            <a:extLst>
+              <a:ext uri="{FF2B5EF4-FFF2-40B4-BE49-F238E27FC236}">
+                <a16:creationId xmlns:a16="http://schemas.microsoft.com/office/drawing/2014/main" id="{53781C9A-27D2-3645-A553-0E6262955F2C}"/>
+              </a:ext>
+            </a:extLst>
+          </p:cNvPr>
+          <p:cNvSpPr>
+            <a:spLocks noGrp="1"/>
+          </p:cNvSpPr>
+          <p:nvPr>
+            <p:ph type="title"/>
+          </p:nvPr>
+        </p:nvSpPr>
+        <p:spPr/>
+        <p:txBody>
+          <a:bodyPr/>
+          <a:lstStyle/>
+          <a:p>
+            <a:r>
+              <a:rPr lang="en-GB" dirty="0"/>
+              <a:t>Rolling Horizon Evolution</a:t>
+            </a:r>
+            <a:endParaRPr lang="en-US" dirty="0"/>
+          </a:p>
+        </p:txBody>
+      </p:sp>
+      <p:sp>
+        <p:nvSpPr>
+          <p:cNvPr id="3" name="Content Placeholder 2">
+            <a:extLst>
+              <a:ext uri="{FF2B5EF4-FFF2-40B4-BE49-F238E27FC236}">
+                <a16:creationId xmlns:a16="http://schemas.microsoft.com/office/drawing/2014/main" id="{B8B367FB-17C6-834D-A502-8EF343713406}"/>
+              </a:ext>
+            </a:extLst>
+          </p:cNvPr>
+          <p:cNvSpPr>
+            <a:spLocks noGrp="1"/>
+          </p:cNvSpPr>
+          <p:nvPr>
+            <p:ph idx="1"/>
+          </p:nvPr>
+        </p:nvSpPr>
+        <p:spPr>
+          <a:xfrm>
+            <a:off x="1085088" y="1475232"/>
+            <a:ext cx="9314688" cy="5157216"/>
+          </a:xfrm>
+        </p:spPr>
+        <p:txBody>
+          <a:bodyPr>
+            <a:normAutofit/>
+          </a:bodyPr>
+          <a:lstStyle/>
+          <a:p>
+            <a:r>
+              <a:rPr lang="en-GB" dirty="0"/>
+              <a:t>Evolves sequences of actions/numbers in real-time</a:t>
+            </a:r>
+          </a:p>
+          <a:p>
+            <a:pPr lvl="1"/>
+            <a:r>
+              <a:rPr lang="en-GB" dirty="0"/>
+              <a:t>E.g.: [left, thrust, shoot, shoot, left, thrust, right, …]</a:t>
+            </a:r>
+          </a:p>
+          <a:p>
+            <a:r>
+              <a:rPr lang="en-GB" dirty="0"/>
+              <a:t>These are interpreted as action sequences and simulated on a copy of the game</a:t>
+            </a:r>
+          </a:p>
+          <a:p>
+            <a:r>
+              <a:rPr lang="en-GB" dirty="0"/>
+              <a:t>Game score may be used as the fitness function</a:t>
+            </a:r>
+          </a:p>
+          <a:p>
+            <a:r>
+              <a:rPr lang="en-GB" dirty="0"/>
+              <a:t>Choose the sequence that leads to the best score, and take the first action</a:t>
+            </a:r>
+          </a:p>
+          <a:p>
+            <a:pPr lvl="1"/>
+            <a:r>
+              <a:rPr lang="en-GB" dirty="0"/>
+              <a:t>If using a shift buffer, then shift the sequence forward and add a random action to the end to seed the population for the next decision step of the game</a:t>
+            </a:r>
+          </a:p>
+          <a:p>
+            <a:r>
+              <a:rPr lang="en-GB" dirty="0"/>
+              <a:t>Then repeat for each step / turn of the game</a:t>
+            </a:r>
+          </a:p>
+          <a:p>
+            <a:pPr marL="0" indent="0">
+              <a:buNone/>
+            </a:pPr>
+            <a:endParaRPr lang="en-US" dirty="0"/>
+          </a:p>
+        </p:txBody>
+      </p:sp>
+    </p:spTree>
+    <p:extLst>
+      <p:ext uri="{BB962C8B-B14F-4D97-AF65-F5344CB8AC3E}">
+        <p14:creationId xmlns:p14="http://schemas.microsoft.com/office/powerpoint/2010/main" val="3929685423"/>
+      </p:ext>
+    </p:extLst>
+  </p:cSld>
+  <p:clrMapOvr>
+    <a:masterClrMapping/>
+  </p:clrMapOvr>
+</p:sld>
+</file>
+
+<file path=ppt/slides/slide2.xml><?xml version="1.0" encoding="utf-8"?>
+<p:sld xmlns:a="http://schemas.openxmlformats.org/drawingml/2006/main" xmlns:r="http://schemas.openxmlformats.org/officeDocument/2006/relationships" xmlns:p="http://schemas.openxmlformats.org/presentationml/2006/main">
+  <p:cSld>
+    <p:spTree>
+      <p:nvGrpSpPr>
+        <p:cNvPr id="1" name=""/>
+        <p:cNvGrpSpPr/>
+        <p:nvPr/>
+      </p:nvGrpSpPr>
+      <p:grpSpPr>
+        <a:xfrm>
+          <a:off x="0" y="0"/>
+          <a:ext cx="0" cy="0"/>
+          <a:chOff x="0" y="0"/>
+          <a:chExt cx="0" cy="0"/>
+        </a:xfrm>
+      </p:grpSpPr>
+      <p:sp>
+        <p:nvSpPr>
+          <p:cNvPr id="2" name="Title 1">
+            <a:extLst>
+              <a:ext uri="{FF2B5EF4-FFF2-40B4-BE49-F238E27FC236}">
+                <a16:creationId xmlns:a16="http://schemas.microsoft.com/office/drawing/2014/main" id="{B355399C-EBA8-2D4E-BC36-813152B7F80E}"/>
+              </a:ext>
+            </a:extLst>
+          </p:cNvPr>
+          <p:cNvSpPr>
+            <a:spLocks noGrp="1"/>
+          </p:cNvSpPr>
+          <p:nvPr>
+            <p:ph type="title"/>
+          </p:nvPr>
+        </p:nvSpPr>
+        <p:spPr/>
+        <p:txBody>
+          <a:bodyPr/>
+          <a:lstStyle/>
+          <a:p>
+            <a:r>
+              <a:rPr lang="en-US" dirty="0"/>
+              <a:t>Motivation</a:t>
+            </a:r>
+          </a:p>
+        </p:txBody>
+      </p:sp>
+      <p:sp>
+        <p:nvSpPr>
+          <p:cNvPr id="3" name="Content Placeholder 2">
+            <a:extLst>
+              <a:ext uri="{FF2B5EF4-FFF2-40B4-BE49-F238E27FC236}">
+                <a16:creationId xmlns:a16="http://schemas.microsoft.com/office/drawing/2014/main" id="{B6481C69-98B4-4543-868C-0A13710DC9BF}"/>
+              </a:ext>
+            </a:extLst>
+          </p:cNvPr>
+          <p:cNvSpPr>
+            <a:spLocks noGrp="1"/>
+          </p:cNvSpPr>
+          <p:nvPr>
+            <p:ph idx="1"/>
+          </p:nvPr>
+        </p:nvSpPr>
+        <p:spPr/>
+        <p:txBody>
+          <a:bodyPr>
+            <a:normAutofit lnSpcReduction="10000"/>
+          </a:bodyPr>
+          <a:lstStyle/>
+          <a:p>
+            <a:r>
+              <a:rPr lang="en-US" sz="3600" dirty="0"/>
+              <a:t>Emphasize importance of parameter tuning in game AI</a:t>
+            </a:r>
+          </a:p>
+          <a:p>
+            <a:pPr lvl="1"/>
+            <a:r>
+              <a:rPr lang="en-US" sz="3200" dirty="0"/>
+              <a:t>And evaluate which methods work best</a:t>
+            </a:r>
+          </a:p>
+          <a:p>
+            <a:r>
+              <a:rPr lang="en-US" sz="3600" dirty="0"/>
+              <a:t>Best seen as a </a:t>
+            </a:r>
+            <a:r>
+              <a:rPr lang="en-US" sz="3600" b="1" dirty="0"/>
+              <a:t>NOISY</a:t>
+            </a:r>
+            <a:r>
+              <a:rPr lang="en-US" sz="3600" dirty="0"/>
+              <a:t> optimisation problem</a:t>
+            </a:r>
+          </a:p>
+          <a:p>
+            <a:pPr lvl="1"/>
+            <a:r>
+              <a:rPr lang="en-US" sz="3200" dirty="0"/>
+              <a:t>Stochastic games</a:t>
+            </a:r>
+          </a:p>
+          <a:p>
+            <a:pPr lvl="1"/>
+            <a:r>
+              <a:rPr lang="en-US" sz="3200" dirty="0"/>
+              <a:t>Stochastic agents</a:t>
+            </a:r>
+          </a:p>
+          <a:p>
+            <a:r>
+              <a:rPr lang="en-US" sz="3600" dirty="0"/>
+              <a:t>Develop additional games for testing AI agents</a:t>
+            </a:r>
+          </a:p>
+          <a:p>
+            <a:pPr lvl="1"/>
+            <a:r>
+              <a:rPr lang="en-US" sz="3200" dirty="0"/>
+              <a:t>Make them efficient to enable rapid experimentation without requiring heavy CPU/GPU resource (more energy-efficient also)</a:t>
+            </a:r>
+          </a:p>
+        </p:txBody>
+      </p:sp>
+    </p:spTree>
+    <p:extLst>
+      <p:ext uri="{BB962C8B-B14F-4D97-AF65-F5344CB8AC3E}">
+        <p14:creationId xmlns:p14="http://schemas.microsoft.com/office/powerpoint/2010/main" val="246028498"/>
+      </p:ext>
+    </p:extLst>
+  </p:cSld>
+  <p:clrMapOvr>
+    <a:masterClrMapping/>
+  </p:clrMapOvr>
+</p:sld>
+</file>
+
+<file path=ppt/slides/slide20.xml><?xml version="1.0" encoding="utf-8"?>
+<p:sld xmlns:a="http://schemas.openxmlformats.org/drawingml/2006/main" xmlns:r="http://schemas.openxmlformats.org/officeDocument/2006/relationships" xmlns:p="http://schemas.openxmlformats.org/presentationml/2006/main">
+  <p:cSld>
+    <p:spTree>
+      <p:nvGrpSpPr>
+        <p:cNvPr id="1" name=""/>
+        <p:cNvGrpSpPr/>
+        <p:nvPr/>
+      </p:nvGrpSpPr>
+      <p:grpSpPr>
+        <a:xfrm>
+          <a:off x="0" y="0"/>
+          <a:ext cx="0" cy="0"/>
+          <a:chOff x="0" y="0"/>
+          <a:chExt cx="0" cy="0"/>
+        </a:xfrm>
+      </p:grpSpPr>
+      <p:sp>
+        <p:nvSpPr>
+          <p:cNvPr id="2" name="Title 1">
+            <a:extLst>
+              <a:ext uri="{FF2B5EF4-FFF2-40B4-BE49-F238E27FC236}">
+                <a16:creationId xmlns:a16="http://schemas.microsoft.com/office/drawing/2014/main" id="{132512BE-E2AA-6F41-8966-64262C2B0A46}"/>
+              </a:ext>
+            </a:extLst>
+          </p:cNvPr>
+          <p:cNvSpPr>
+            <a:spLocks noGrp="1"/>
+          </p:cNvSpPr>
+          <p:nvPr>
+            <p:ph type="title"/>
+          </p:nvPr>
+        </p:nvSpPr>
+        <p:spPr/>
+        <p:txBody>
+          <a:bodyPr/>
+          <a:lstStyle/>
+          <a:p>
+            <a:r>
+              <a:rPr lang="en-US" dirty="0"/>
+              <a:t>Test Game: Simplified Planet Wars</a:t>
+            </a:r>
+          </a:p>
+        </p:txBody>
+      </p:sp>
+      <p:sp>
+        <p:nvSpPr>
+          <p:cNvPr id="3" name="Content Placeholder 2">
+            <a:extLst>
+              <a:ext uri="{FF2B5EF4-FFF2-40B4-BE49-F238E27FC236}">
+                <a16:creationId xmlns:a16="http://schemas.microsoft.com/office/drawing/2014/main" id="{591A7210-42FF-3D46-8AD5-00A68D125037}"/>
+              </a:ext>
+            </a:extLst>
+          </p:cNvPr>
+          <p:cNvSpPr>
+            <a:spLocks noGrp="1"/>
+          </p:cNvSpPr>
+          <p:nvPr>
+            <p:ph idx="1"/>
+          </p:nvPr>
+        </p:nvSpPr>
+        <p:spPr>
+          <a:xfrm>
+            <a:off x="658368" y="1825624"/>
+            <a:ext cx="5136790" cy="4745863"/>
+          </a:xfrm>
+        </p:spPr>
+        <p:txBody>
+          <a:bodyPr>
+            <a:normAutofit fontScale="77500" lnSpcReduction="20000"/>
+          </a:bodyPr>
+          <a:lstStyle/>
+          <a:p>
+            <a:r>
+              <a:rPr lang="en-US" dirty="0"/>
+              <a:t>Random initial states (ownership, planet sizes and number of ships)</a:t>
+            </a:r>
+          </a:p>
+          <a:p>
+            <a:r>
+              <a:rPr lang="en-US" dirty="0"/>
+              <a:t>Each disc is a planet showing the number of ships and ownership (+</a:t>
+            </a:r>
+            <a:r>
+              <a:rPr lang="en-US" dirty="0" err="1"/>
+              <a:t>ve</a:t>
+            </a:r>
+            <a:r>
+              <a:rPr lang="en-US" dirty="0"/>
+              <a:t> green)</a:t>
+            </a:r>
+          </a:p>
+          <a:p>
+            <a:r>
+              <a:rPr lang="en-US" dirty="0"/>
+              <a:t>Planets grow ships are rate proportional to their size</a:t>
+            </a:r>
+          </a:p>
+          <a:p>
+            <a:r>
+              <a:rPr lang="en-US" dirty="0"/>
+              <a:t>Ships can only be transferred via each player’s buffer and their planet of focus</a:t>
+            </a:r>
+          </a:p>
+          <a:p>
+            <a:r>
+              <a:rPr lang="en-US" dirty="0"/>
+              <a:t>Aim: wipe out opponent, or have most ships at time limit</a:t>
+            </a:r>
+          </a:p>
+          <a:p>
+            <a:r>
+              <a:rPr lang="en-US" dirty="0"/>
+              <a:t>Win/loss game (player is only rewarded for winning, margin does not matter)</a:t>
+            </a:r>
+          </a:p>
+          <a:p>
+            <a:r>
+              <a:rPr lang="en-US" dirty="0"/>
+              <a:t>Constant speed irrespective of number of planets</a:t>
+            </a:r>
+          </a:p>
+        </p:txBody>
+      </p:sp>
+      <p:pic>
+        <p:nvPicPr>
+          <p:cNvPr id="4" name="Picture 3">
+            <a:extLst>
+              <a:ext uri="{FF2B5EF4-FFF2-40B4-BE49-F238E27FC236}">
+                <a16:creationId xmlns:a16="http://schemas.microsoft.com/office/drawing/2014/main" id="{E965B035-0D31-EC40-830A-69D4DD2F1190}"/>
+              </a:ext>
+            </a:extLst>
+          </p:cNvPr>
+          <p:cNvPicPr>
+            <a:picLocks noChangeAspect="1"/>
+          </p:cNvPicPr>
+          <p:nvPr/>
+        </p:nvPicPr>
+        <p:blipFill>
+          <a:blip r:embed="rId3"/>
+          <a:stretch>
+            <a:fillRect/>
+          </a:stretch>
+        </p:blipFill>
+        <p:spPr>
+          <a:xfrm>
+            <a:off x="5795158" y="1574439"/>
+            <a:ext cx="6172652" cy="4853709"/>
+          </a:xfrm>
+          <a:prstGeom prst="rect">
+            <a:avLst/>
+          </a:prstGeom>
+        </p:spPr>
+      </p:pic>
+    </p:spTree>
+    <p:extLst>
+      <p:ext uri="{BB962C8B-B14F-4D97-AF65-F5344CB8AC3E}">
+        <p14:creationId xmlns:p14="http://schemas.microsoft.com/office/powerpoint/2010/main" val="1195228240"/>
+      </p:ext>
+    </p:extLst>
+  </p:cSld>
+  <p:clrMapOvr>
+    <a:masterClrMapping/>
+  </p:clrMapOvr>
+</p:sld>
+</file>
+
+<file path=ppt/slides/slide21.xml><?xml version="1.0" encoding="utf-8"?>
+<p:sld xmlns:a="http://schemas.openxmlformats.org/drawingml/2006/main" xmlns:r="http://schemas.openxmlformats.org/officeDocument/2006/relationships" xmlns:p="http://schemas.openxmlformats.org/presentationml/2006/main">
+  <p:cSld>
+    <p:spTree>
+      <p:nvGrpSpPr>
+        <p:cNvPr id="1" name=""/>
+        <p:cNvGrpSpPr/>
+        <p:nvPr/>
+      </p:nvGrpSpPr>
+      <p:grpSpPr>
+        <a:xfrm>
+          <a:off x="0" y="0"/>
+          <a:ext cx="0" cy="0"/>
+          <a:chOff x="0" y="0"/>
+          <a:chExt cx="0" cy="0"/>
+        </a:xfrm>
+      </p:grpSpPr>
+      <p:sp>
+        <p:nvSpPr>
+          <p:cNvPr id="2" name="Title 1">
+            <a:extLst>
+              <a:ext uri="{FF2B5EF4-FFF2-40B4-BE49-F238E27FC236}">
+                <a16:creationId xmlns:a16="http://schemas.microsoft.com/office/drawing/2014/main" id="{FC31FE78-169C-094B-9A7C-31FE0D133AA7}"/>
+              </a:ext>
+            </a:extLst>
+          </p:cNvPr>
+          <p:cNvSpPr>
+            <a:spLocks noGrp="1"/>
+          </p:cNvSpPr>
+          <p:nvPr>
+            <p:ph type="title"/>
+          </p:nvPr>
+        </p:nvSpPr>
+        <p:spPr/>
+        <p:txBody>
+          <a:bodyPr/>
+          <a:lstStyle/>
+          <a:p>
+            <a:r>
+              <a:rPr lang="en-US" dirty="0"/>
+              <a:t>Results</a:t>
+            </a:r>
+          </a:p>
+        </p:txBody>
+      </p:sp>
+      <p:sp>
+        <p:nvSpPr>
+          <p:cNvPr id="3" name="Content Placeholder 2">
+            <a:extLst>
+              <a:ext uri="{FF2B5EF4-FFF2-40B4-BE49-F238E27FC236}">
+                <a16:creationId xmlns:a16="http://schemas.microsoft.com/office/drawing/2014/main" id="{2E0DDBF8-FE8C-544D-9A4B-3328157FDE8E}"/>
+              </a:ext>
+            </a:extLst>
+          </p:cNvPr>
+          <p:cNvSpPr>
+            <a:spLocks noGrp="1"/>
+          </p:cNvSpPr>
+          <p:nvPr>
+            <p:ph idx="1"/>
+          </p:nvPr>
+        </p:nvSpPr>
+        <p:spPr>
+          <a:xfrm>
+            <a:off x="629781" y="1893825"/>
+            <a:ext cx="5289468" cy="4351338"/>
+          </a:xfrm>
+        </p:spPr>
+        <p:txBody>
+          <a:bodyPr>
+            <a:normAutofit fontScale="92500" lnSpcReduction="10000"/>
+          </a:bodyPr>
+          <a:lstStyle/>
+          <a:p>
+            <a:r>
+              <a:rPr lang="en-US" dirty="0"/>
+              <a:t>Extremely noisy fitness function</a:t>
+            </a:r>
+          </a:p>
+          <a:p>
+            <a:pPr lvl="1"/>
+            <a:r>
+              <a:rPr lang="en-US" dirty="0"/>
+              <a:t>RMHC (1) uses no resampling and is very poor</a:t>
+            </a:r>
+          </a:p>
+          <a:p>
+            <a:pPr lvl="1"/>
+            <a:r>
+              <a:rPr lang="en-US" dirty="0"/>
+              <a:t>RMHC (5) resamples but wastes budget</a:t>
+            </a:r>
+          </a:p>
+          <a:p>
+            <a:pPr lvl="1"/>
+            <a:r>
+              <a:rPr lang="en-US" dirty="0"/>
+              <a:t>CMA-ES is also poor until we increase its sample budget (hence no longer a fair comparison)</a:t>
+            </a:r>
+          </a:p>
+          <a:p>
+            <a:r>
+              <a:rPr lang="en-US" dirty="0"/>
+              <a:t>NTBEA and SMAC have the most sophisticated models and perform by far the best </a:t>
+            </a:r>
+          </a:p>
+          <a:p>
+            <a:r>
+              <a:rPr lang="en-US" dirty="0"/>
+              <a:t>When operating with the small sample budget</a:t>
+            </a:r>
+          </a:p>
+        </p:txBody>
+      </p:sp>
+      <p:pic>
+        <p:nvPicPr>
+          <p:cNvPr id="4" name="Picture 3">
+            <a:extLst>
+              <a:ext uri="{FF2B5EF4-FFF2-40B4-BE49-F238E27FC236}">
+                <a16:creationId xmlns:a16="http://schemas.microsoft.com/office/drawing/2014/main" id="{9DD328D3-017A-1E4E-884E-F12DA07A532D}"/>
+              </a:ext>
+            </a:extLst>
+          </p:cNvPr>
+          <p:cNvPicPr>
+            <a:picLocks noChangeAspect="1"/>
+          </p:cNvPicPr>
+          <p:nvPr/>
+        </p:nvPicPr>
+        <p:blipFill>
+          <a:blip r:embed="rId2"/>
+          <a:stretch>
+            <a:fillRect/>
+          </a:stretch>
+        </p:blipFill>
+        <p:spPr>
+          <a:xfrm>
+            <a:off x="5710829" y="700644"/>
+            <a:ext cx="5740064" cy="5747657"/>
+          </a:xfrm>
+          <a:prstGeom prst="rect">
+            <a:avLst/>
+          </a:prstGeom>
+        </p:spPr>
+      </p:pic>
+    </p:spTree>
+    <p:extLst>
+      <p:ext uri="{BB962C8B-B14F-4D97-AF65-F5344CB8AC3E}">
+        <p14:creationId xmlns:p14="http://schemas.microsoft.com/office/powerpoint/2010/main" val="682079936"/>
+      </p:ext>
+    </p:extLst>
+  </p:cSld>
+  <p:clrMapOvr>
+    <a:masterClrMapping/>
+  </p:clrMapOvr>
+</p:sld>
+</file>
+
+<file path=ppt/slides/slide22.xml><?xml version="1.0" encoding="utf-8"?>
+<p:sld xmlns:a="http://schemas.openxmlformats.org/drawingml/2006/main" xmlns:r="http://schemas.openxmlformats.org/officeDocument/2006/relationships" xmlns:p="http://schemas.openxmlformats.org/presentationml/2006/main">
+  <p:cSld>
+    <p:spTree>
+      <p:nvGrpSpPr>
+        <p:cNvPr id="1" name=""/>
+        <p:cNvGrpSpPr/>
+        <p:nvPr/>
+      </p:nvGrpSpPr>
+      <p:grpSpPr>
+        <a:xfrm>
+          <a:off x="0" y="0"/>
+          <a:ext cx="0" cy="0"/>
+          <a:chOff x="0" y="0"/>
+          <a:chExt cx="0" cy="0"/>
+        </a:xfrm>
+      </p:grpSpPr>
+      <p:sp>
+        <p:nvSpPr>
+          <p:cNvPr id="2" name="Title 1">
+            <a:extLst>
+              <a:ext uri="{FF2B5EF4-FFF2-40B4-BE49-F238E27FC236}">
+                <a16:creationId xmlns:a16="http://schemas.microsoft.com/office/drawing/2014/main" id="{CB7CB16B-C51F-224C-955F-F7306A74C728}"/>
+              </a:ext>
+            </a:extLst>
+          </p:cNvPr>
+          <p:cNvSpPr>
+            <a:spLocks noGrp="1"/>
+          </p:cNvSpPr>
+          <p:nvPr>
+            <p:ph type="title"/>
+          </p:nvPr>
+        </p:nvSpPr>
+        <p:spPr/>
+        <p:txBody>
+          <a:bodyPr/>
+          <a:lstStyle/>
+          <a:p>
+            <a:r>
+              <a:rPr lang="en-US" dirty="0"/>
+              <a:t>Insight into parameter combinations</a:t>
+            </a:r>
+            <a:br>
+              <a:rPr lang="en-US" dirty="0"/>
+            </a:br>
+            <a:r>
+              <a:rPr lang="en-US" dirty="0"/>
+              <a:t>(Typically 1,</a:t>
+            </a:r>
+            <a:r>
+              <a:rPr lang="en-US" b="1" dirty="0"/>
+              <a:t>2</a:t>
+            </a:r>
+            <a:r>
+              <a:rPr lang="en-US" dirty="0"/>
+              <a:t>,3 and N-Tuple)</a:t>
+            </a:r>
+          </a:p>
+        </p:txBody>
+      </p:sp>
+      <p:sp>
+        <p:nvSpPr>
+          <p:cNvPr id="3" name="Content Placeholder 2">
+            <a:extLst>
+              <a:ext uri="{FF2B5EF4-FFF2-40B4-BE49-F238E27FC236}">
+                <a16:creationId xmlns:a16="http://schemas.microsoft.com/office/drawing/2014/main" id="{CEAE3185-FB96-B447-8E4B-CE294B78AFF8}"/>
+              </a:ext>
+            </a:extLst>
+          </p:cNvPr>
+          <p:cNvSpPr>
+            <a:spLocks noGrp="1"/>
+          </p:cNvSpPr>
+          <p:nvPr>
+            <p:ph idx="1"/>
+          </p:nvPr>
+        </p:nvSpPr>
+        <p:spPr>
+          <a:xfrm>
+            <a:off x="838200" y="1825625"/>
+            <a:ext cx="4291940" cy="4351338"/>
+          </a:xfrm>
+        </p:spPr>
+        <p:txBody>
+          <a:bodyPr/>
+          <a:lstStyle/>
+          <a:p>
+            <a:r>
+              <a:rPr lang="en-US" dirty="0"/>
+              <a:t>For each combination we also get more complete stats including standard error, min and max</a:t>
+            </a:r>
+          </a:p>
+        </p:txBody>
+      </p:sp>
+      <p:pic>
+        <p:nvPicPr>
+          <p:cNvPr id="4" name="Picture 3">
+            <a:extLst>
+              <a:ext uri="{FF2B5EF4-FFF2-40B4-BE49-F238E27FC236}">
+                <a16:creationId xmlns:a16="http://schemas.microsoft.com/office/drawing/2014/main" id="{5C4DA62A-2925-9C41-8FE5-11F961F5B8CF}"/>
+              </a:ext>
+            </a:extLst>
+          </p:cNvPr>
+          <p:cNvPicPr>
+            <a:picLocks noChangeAspect="1"/>
+          </p:cNvPicPr>
+          <p:nvPr/>
+        </p:nvPicPr>
+        <p:blipFill>
+          <a:blip r:embed="rId2"/>
+          <a:stretch>
+            <a:fillRect/>
+          </a:stretch>
+        </p:blipFill>
+        <p:spPr>
+          <a:xfrm>
+            <a:off x="5667004" y="1825625"/>
+            <a:ext cx="5686796" cy="4543574"/>
+          </a:xfrm>
+          <a:prstGeom prst="rect">
+            <a:avLst/>
+          </a:prstGeom>
+        </p:spPr>
+      </p:pic>
+    </p:spTree>
+    <p:extLst>
+      <p:ext uri="{BB962C8B-B14F-4D97-AF65-F5344CB8AC3E}">
+        <p14:creationId xmlns:p14="http://schemas.microsoft.com/office/powerpoint/2010/main" val="3542740012"/>
+      </p:ext>
+    </p:extLst>
+  </p:cSld>
+  <p:clrMapOvr>
+    <a:masterClrMapping/>
+  </p:clrMapOvr>
+</p:sld>
+</file>
+
+<file path=ppt/slides/slide23.xml><?xml version="1.0" encoding="utf-8"?>
+<p:sld xmlns:a="http://schemas.openxmlformats.org/drawingml/2006/main" xmlns:r="http://schemas.openxmlformats.org/officeDocument/2006/relationships" xmlns:p="http://schemas.openxmlformats.org/presentationml/2006/main">
+  <p:cSld>
+    <p:spTree>
+      <p:nvGrpSpPr>
+        <p:cNvPr id="1" name=""/>
+        <p:cNvGrpSpPr/>
+        <p:nvPr/>
+      </p:nvGrpSpPr>
+      <p:grpSpPr>
+        <a:xfrm>
+          <a:off x="0" y="0"/>
+          <a:ext cx="0" cy="0"/>
+          <a:chOff x="0" y="0"/>
+          <a:chExt cx="0" cy="0"/>
+        </a:xfrm>
+      </p:grpSpPr>
+      <p:sp>
+        <p:nvSpPr>
+          <p:cNvPr id="2" name="Title 1">
+            <a:extLst>
+              <a:ext uri="{FF2B5EF4-FFF2-40B4-BE49-F238E27FC236}">
+                <a16:creationId xmlns:a16="http://schemas.microsoft.com/office/drawing/2014/main" id="{546BB355-4267-F84B-824C-C28906599D9F}"/>
+              </a:ext>
+            </a:extLst>
+          </p:cNvPr>
+          <p:cNvSpPr>
+            <a:spLocks noGrp="1"/>
+          </p:cNvSpPr>
+          <p:nvPr>
+            <p:ph type="title"/>
+          </p:nvPr>
+        </p:nvSpPr>
+        <p:spPr/>
+        <p:txBody>
+          <a:bodyPr/>
+          <a:lstStyle/>
+          <a:p>
+            <a:r>
+              <a:rPr lang="en-US" dirty="0"/>
+              <a:t>Analysing convergence of NTBEA (8-params)</a:t>
+            </a:r>
+          </a:p>
+        </p:txBody>
+      </p:sp>
+      <p:sp>
+        <p:nvSpPr>
+          <p:cNvPr id="3" name="Content Placeholder 2">
+            <a:extLst>
+              <a:ext uri="{FF2B5EF4-FFF2-40B4-BE49-F238E27FC236}">
+                <a16:creationId xmlns:a16="http://schemas.microsoft.com/office/drawing/2014/main" id="{7A7E67C9-D7AC-4F40-933A-E3EAD3620464}"/>
+              </a:ext>
+            </a:extLst>
+          </p:cNvPr>
+          <p:cNvSpPr>
+            <a:spLocks noGrp="1"/>
+          </p:cNvSpPr>
+          <p:nvPr>
+            <p:ph idx="1"/>
+          </p:nvPr>
+        </p:nvSpPr>
+        <p:spPr>
+          <a:xfrm>
+            <a:off x="838200" y="1825625"/>
+            <a:ext cx="3508169" cy="4351338"/>
+          </a:xfrm>
+        </p:spPr>
+        <p:txBody>
+          <a:bodyPr>
+            <a:normAutofit fontScale="85000" lnSpcReduction="20000"/>
+          </a:bodyPr>
+          <a:lstStyle/>
+          <a:p>
+            <a:r>
+              <a:rPr lang="en-US" dirty="0"/>
+              <a:t>This plot is from a game parameter optimisation problem (sample budget 200)</a:t>
+            </a:r>
+          </a:p>
+          <a:p>
+            <a:r>
+              <a:rPr lang="en-US" dirty="0"/>
+              <a:t>It illustrates how the sampling explores options that the algorithm does not consider to be best</a:t>
+            </a:r>
+          </a:p>
+          <a:p>
+            <a:r>
+              <a:rPr lang="en-US" dirty="0"/>
+              <a:t>And also the </a:t>
+            </a:r>
+            <a:r>
+              <a:rPr lang="en-US" b="1" dirty="0"/>
+              <a:t>anytime</a:t>
+            </a:r>
+            <a:r>
+              <a:rPr lang="en-US" dirty="0"/>
+              <a:t> nature of the algorithm</a:t>
+            </a:r>
+          </a:p>
+          <a:p>
+            <a:r>
+              <a:rPr lang="en-US" dirty="0"/>
+              <a:t>Note how the “best” has converged on the final recommendation about 30 iterations in advance</a:t>
+            </a:r>
+          </a:p>
+        </p:txBody>
+      </p:sp>
+      <p:pic>
+        <p:nvPicPr>
+          <p:cNvPr id="4" name="Picture 3">
+            <a:extLst>
+              <a:ext uri="{FF2B5EF4-FFF2-40B4-BE49-F238E27FC236}">
+                <a16:creationId xmlns:a16="http://schemas.microsoft.com/office/drawing/2014/main" id="{EC4E98F5-783A-A943-AD00-BF900E6E50B7}"/>
+              </a:ext>
+            </a:extLst>
+          </p:cNvPr>
+          <p:cNvPicPr>
+            <a:picLocks noChangeAspect="1"/>
+          </p:cNvPicPr>
+          <p:nvPr/>
+        </p:nvPicPr>
+        <p:blipFill>
+          <a:blip r:embed="rId3"/>
+          <a:stretch>
+            <a:fillRect/>
+          </a:stretch>
+        </p:blipFill>
+        <p:spPr>
+          <a:xfrm>
+            <a:off x="5201392" y="2345270"/>
+            <a:ext cx="5271536" cy="3917319"/>
+          </a:xfrm>
+          <a:prstGeom prst="rect">
+            <a:avLst/>
+          </a:prstGeom>
+        </p:spPr>
+      </p:pic>
+      <p:pic>
+        <p:nvPicPr>
+          <p:cNvPr id="5" name="Picture 4">
+            <a:extLst>
+              <a:ext uri="{FF2B5EF4-FFF2-40B4-BE49-F238E27FC236}">
+                <a16:creationId xmlns:a16="http://schemas.microsoft.com/office/drawing/2014/main" id="{EEF789B7-9A53-484E-A564-490F82C43340}"/>
+              </a:ext>
+            </a:extLst>
+          </p:cNvPr>
+          <p:cNvPicPr>
+            <a:picLocks noChangeAspect="1"/>
+          </p:cNvPicPr>
+          <p:nvPr/>
+        </p:nvPicPr>
+        <p:blipFill>
+          <a:blip r:embed="rId4"/>
+          <a:stretch>
+            <a:fillRect/>
+          </a:stretch>
+        </p:blipFill>
+        <p:spPr>
+          <a:xfrm>
+            <a:off x="5201392" y="1541360"/>
+            <a:ext cx="5271536" cy="803909"/>
+          </a:xfrm>
+          <a:prstGeom prst="rect">
+            <a:avLst/>
+          </a:prstGeom>
+        </p:spPr>
+      </p:pic>
+    </p:spTree>
+    <p:extLst>
+      <p:ext uri="{BB962C8B-B14F-4D97-AF65-F5344CB8AC3E}">
+        <p14:creationId xmlns:p14="http://schemas.microsoft.com/office/powerpoint/2010/main" val="3755633186"/>
+      </p:ext>
+    </p:extLst>
+  </p:cSld>
+  <p:clrMapOvr>
+    <a:masterClrMapping/>
+  </p:clrMapOvr>
+</p:sld>
+</file>
+
+<file path=ppt/slides/slide24.xml><?xml version="1.0" encoding="utf-8"?>
+<p:sld xmlns:a="http://schemas.openxmlformats.org/drawingml/2006/main" xmlns:r="http://schemas.openxmlformats.org/officeDocument/2006/relationships" xmlns:p="http://schemas.openxmlformats.org/presentationml/2006/main">
+  <p:cSld>
+    <p:spTree>
+      <p:nvGrpSpPr>
+        <p:cNvPr id="1" name=""/>
+        <p:cNvGrpSpPr/>
+        <p:nvPr/>
+      </p:nvGrpSpPr>
+      <p:grpSpPr>
+        <a:xfrm>
+          <a:off x="0" y="0"/>
+          <a:ext cx="0" cy="0"/>
+          <a:chOff x="0" y="0"/>
+          <a:chExt cx="0" cy="0"/>
+        </a:xfrm>
+      </p:grpSpPr>
+      <p:sp>
+        <p:nvSpPr>
+          <p:cNvPr id="2" name="Title 1">
+            <a:extLst>
+              <a:ext uri="{FF2B5EF4-FFF2-40B4-BE49-F238E27FC236}">
+                <a16:creationId xmlns:a16="http://schemas.microsoft.com/office/drawing/2014/main" id="{FA64DBD2-F320-1849-98C4-90ACCB3CB9F2}"/>
+              </a:ext>
+            </a:extLst>
+          </p:cNvPr>
+          <p:cNvSpPr>
+            <a:spLocks noGrp="1"/>
+          </p:cNvSpPr>
+          <p:nvPr>
+            <p:ph type="title"/>
+          </p:nvPr>
+        </p:nvSpPr>
+        <p:spPr/>
+        <p:txBody>
+          <a:bodyPr/>
+          <a:lstStyle/>
+          <a:p>
+            <a:r>
+              <a:rPr lang="en-US" dirty="0"/>
+              <a:t>Conclusions </a:t>
+            </a:r>
+          </a:p>
+        </p:txBody>
+      </p:sp>
+      <p:sp>
+        <p:nvSpPr>
+          <p:cNvPr id="3" name="Content Placeholder 2">
+            <a:extLst>
+              <a:ext uri="{FF2B5EF4-FFF2-40B4-BE49-F238E27FC236}">
+                <a16:creationId xmlns:a16="http://schemas.microsoft.com/office/drawing/2014/main" id="{1726BC6D-2FC7-0F48-8DBF-4326A15468EA}"/>
+              </a:ext>
+            </a:extLst>
+          </p:cNvPr>
+          <p:cNvSpPr>
+            <a:spLocks noGrp="1"/>
+          </p:cNvSpPr>
+          <p:nvPr>
+            <p:ph idx="1"/>
+          </p:nvPr>
+        </p:nvSpPr>
+        <p:spPr/>
+        <p:txBody>
+          <a:bodyPr>
+            <a:normAutofit fontScale="92500" lnSpcReduction="20000"/>
+          </a:bodyPr>
+          <a:lstStyle/>
+          <a:p>
+            <a:r>
+              <a:rPr lang="en-US" dirty="0"/>
+              <a:t>New game with significant skill depth</a:t>
+            </a:r>
+          </a:p>
+          <a:p>
+            <a:pPr lvl="1"/>
+            <a:r>
+              <a:rPr lang="en-US" dirty="0"/>
+              <a:t>Evidenced by wide performance variations between the agents</a:t>
+            </a:r>
+          </a:p>
+          <a:p>
+            <a:r>
+              <a:rPr lang="en-US" dirty="0"/>
+              <a:t>Importance of parameter tuning clearly demonstrated</a:t>
+            </a:r>
+          </a:p>
+          <a:p>
+            <a:pPr lvl="1"/>
+            <a:r>
+              <a:rPr lang="en-US" dirty="0"/>
+              <a:t>Well tuned RHEA agents hugely outperformed poorly tuned ones</a:t>
+            </a:r>
+          </a:p>
+          <a:p>
+            <a:r>
+              <a:rPr lang="en-US" dirty="0"/>
+              <a:t>Tests were run with restricted sample budget (only 288 fitness evaluations per </a:t>
+            </a:r>
+            <a:r>
+              <a:rPr lang="en-US" dirty="0" err="1"/>
+              <a:t>optimisation</a:t>
+            </a:r>
+            <a:r>
+              <a:rPr lang="en-US" dirty="0"/>
+              <a:t> run)</a:t>
+            </a:r>
+          </a:p>
+          <a:p>
+            <a:r>
+              <a:rPr lang="en-US" dirty="0"/>
+              <a:t>Model-based clearly performed best</a:t>
+            </a:r>
+          </a:p>
+          <a:p>
+            <a:r>
+              <a:rPr lang="en-US" dirty="0"/>
+              <a:t>NTBEA is especially simple and informative</a:t>
+            </a:r>
+          </a:p>
+          <a:p>
+            <a:pPr lvl="1"/>
+            <a:r>
+              <a:rPr lang="en-US" dirty="0"/>
+              <a:t>We learned that high mutation rates work surprisingly well</a:t>
+            </a:r>
+          </a:p>
+          <a:p>
+            <a:r>
+              <a:rPr lang="en-US" dirty="0"/>
+              <a:t>Currently only works with discrete / discretized parameters</a:t>
+            </a:r>
+          </a:p>
+          <a:p>
+            <a:pPr lvl="1"/>
+            <a:r>
+              <a:rPr lang="en-US" dirty="0"/>
+              <a:t>Future work will add continuous parameters</a:t>
+            </a:r>
+          </a:p>
+          <a:p>
+            <a:pPr lvl="1"/>
+            <a:r>
+              <a:rPr lang="en-US" dirty="0"/>
+              <a:t>And also tree-structured </a:t>
+            </a:r>
+            <a:r>
+              <a:rPr lang="en-US" dirty="0" err="1"/>
+              <a:t>parameterisation</a:t>
+            </a:r>
+            <a:endParaRPr lang="en-US" dirty="0"/>
+          </a:p>
+        </p:txBody>
+      </p:sp>
+    </p:spTree>
+    <p:extLst>
+      <p:ext uri="{BB962C8B-B14F-4D97-AF65-F5344CB8AC3E}">
+        <p14:creationId xmlns:p14="http://schemas.microsoft.com/office/powerpoint/2010/main" val="2757433156"/>
+      </p:ext>
+    </p:extLst>
+  </p:cSld>
+  <p:clrMapOvr>
+    <a:masterClrMapping/>
+  </p:clrMapOvr>
+</p:sld>
+</file>
+
+<file path=ppt/slides/slide3.xml><?xml version="1.0" encoding="utf-8"?>
+<p:sld xmlns:a="http://schemas.openxmlformats.org/drawingml/2006/main" xmlns:r="http://schemas.openxmlformats.org/officeDocument/2006/relationships" xmlns:p="http://schemas.openxmlformats.org/presentationml/2006/main">
+  <p:cSld>
+    <p:spTree>
+      <p:nvGrpSpPr>
+        <p:cNvPr id="1" name=""/>
+        <p:cNvGrpSpPr/>
+        <p:nvPr/>
+      </p:nvGrpSpPr>
+      <p:grpSpPr>
+        <a:xfrm>
+          <a:off x="0" y="0"/>
+          <a:ext cx="0" cy="0"/>
+          <a:chOff x="0" y="0"/>
+          <a:chExt cx="0" cy="0"/>
+        </a:xfrm>
+      </p:grpSpPr>
+      <p:sp>
+        <p:nvSpPr>
+          <p:cNvPr id="2" name="Title 1"/>
+          <p:cNvSpPr>
+            <a:spLocks noGrp="1"/>
+          </p:cNvSpPr>
+          <p:nvPr>
+            <p:ph type="title"/>
+          </p:nvPr>
+        </p:nvSpPr>
+        <p:spPr>
+          <a:xfrm>
+            <a:off x="2152650" y="394636"/>
+            <a:ext cx="7886700" cy="1386642"/>
+          </a:xfrm>
+        </p:spPr>
+        <p:txBody>
+          <a:bodyPr>
+            <a:normAutofit/>
+          </a:bodyPr>
+          <a:lstStyle/>
+          <a:p>
+            <a:r>
+              <a:rPr lang="en-US" dirty="0"/>
+              <a:t>Hyper-Parameter Optimisation: Considerations</a:t>
+            </a:r>
+          </a:p>
+        </p:txBody>
+      </p:sp>
+      <p:sp>
+        <p:nvSpPr>
+          <p:cNvPr id="3" name="Content Placeholder 2"/>
+          <p:cNvSpPr>
+            <a:spLocks noGrp="1"/>
+          </p:cNvSpPr>
+          <p:nvPr>
+            <p:ph idx="1"/>
+          </p:nvPr>
+        </p:nvSpPr>
+        <p:spPr>
+          <a:xfrm>
+            <a:off x="2152650" y="1839029"/>
+            <a:ext cx="7886700" cy="4571396"/>
+          </a:xfrm>
+        </p:spPr>
+        <p:txBody>
+          <a:bodyPr>
+            <a:normAutofit fontScale="70000" lnSpcReduction="20000"/>
+          </a:bodyPr>
+          <a:lstStyle/>
+          <a:p>
+            <a:r>
+              <a:rPr lang="en-US" dirty="0"/>
+              <a:t>Parameter types:</a:t>
+            </a:r>
+          </a:p>
+          <a:p>
+            <a:pPr lvl="1"/>
+            <a:r>
+              <a:rPr lang="en-US" dirty="0"/>
+              <a:t>Continuous, discrete, categorical</a:t>
+            </a:r>
+          </a:p>
+          <a:p>
+            <a:pPr lvl="1"/>
+            <a:r>
+              <a:rPr lang="en-US" dirty="0"/>
+              <a:t>Flat versus tree structured / conditional</a:t>
+            </a:r>
+          </a:p>
+          <a:p>
+            <a:r>
+              <a:rPr lang="en-US" dirty="0"/>
+              <a:t>Robustness to Noise levels</a:t>
+            </a:r>
+          </a:p>
+          <a:p>
+            <a:pPr lvl="1"/>
+            <a:r>
+              <a:rPr lang="en-US" dirty="0"/>
+              <a:t>From low to high, known versus unknown distributions</a:t>
+            </a:r>
+          </a:p>
+          <a:p>
+            <a:r>
+              <a:rPr lang="en-US" dirty="0"/>
+              <a:t>Efficiency</a:t>
+            </a:r>
+          </a:p>
+          <a:p>
+            <a:pPr lvl="1"/>
+            <a:r>
+              <a:rPr lang="en-US" dirty="0"/>
+              <a:t>Space and time</a:t>
+            </a:r>
+          </a:p>
+          <a:p>
+            <a:pPr lvl="1"/>
+            <a:r>
+              <a:rPr lang="en-US" dirty="0"/>
+              <a:t>Depending on number of samples (fitness evaluations), number of parameters / size of search space</a:t>
+            </a:r>
+          </a:p>
+          <a:p>
+            <a:r>
+              <a:rPr lang="en-US" dirty="0"/>
+              <a:t>Simplicity</a:t>
+            </a:r>
+          </a:p>
+          <a:p>
+            <a:r>
+              <a:rPr lang="en-US" dirty="0"/>
+              <a:t>Interpretability: how informative is the model?</a:t>
+            </a:r>
+          </a:p>
+          <a:p>
+            <a:r>
+              <a:rPr lang="en-US" dirty="0"/>
+              <a:t>System being optimised:</a:t>
+            </a:r>
+          </a:p>
+          <a:p>
+            <a:pPr lvl="1"/>
+            <a:r>
+              <a:rPr lang="en-US" b="1" dirty="0"/>
+              <a:t>Black-box</a:t>
+            </a:r>
+            <a:r>
+              <a:rPr lang="en-US" dirty="0"/>
+              <a:t>, grey-box, white-box (especially important is parameter sharing)</a:t>
+            </a:r>
+          </a:p>
+          <a:p>
+            <a:pPr lvl="1"/>
+            <a:r>
+              <a:rPr lang="en-US" dirty="0"/>
+              <a:t>Is </a:t>
+            </a:r>
+            <a:r>
+              <a:rPr lang="en-US" b="1" dirty="0"/>
+              <a:t>Early Stopping / Anytime</a:t>
+            </a:r>
+            <a:r>
+              <a:rPr lang="en-US" dirty="0"/>
+              <a:t> possible?</a:t>
+            </a:r>
+          </a:p>
+          <a:p>
+            <a:r>
+              <a:rPr lang="en-US" dirty="0"/>
+              <a:t>Available software (simplicity of APIs and operability)</a:t>
+            </a:r>
+          </a:p>
+          <a:p>
+            <a:endParaRPr lang="en-US" dirty="0"/>
+          </a:p>
+        </p:txBody>
+      </p:sp>
+    </p:spTree>
+    <p:extLst>
+      <p:ext uri="{BB962C8B-B14F-4D97-AF65-F5344CB8AC3E}">
+        <p14:creationId xmlns:p14="http://schemas.microsoft.com/office/powerpoint/2010/main" val="1464126142"/>
+      </p:ext>
+    </p:extLst>
+  </p:cSld>
+  <p:clrMapOvr>
+    <a:masterClrMapping/>
+  </p:clrMapOvr>
+</p:sld>
+</file>
+
+<file path=ppt/slides/slide4.xml><?xml version="1.0" encoding="utf-8"?>
+<p:sld xmlns:a="http://schemas.openxmlformats.org/drawingml/2006/main" xmlns:r="http://schemas.openxmlformats.org/officeDocument/2006/relationships" xmlns:p="http://schemas.openxmlformats.org/presentationml/2006/main">
+  <p:cSld>
+    <p:spTree>
+      <p:nvGrpSpPr>
+        <p:cNvPr id="1" name=""/>
+        <p:cNvGrpSpPr/>
+        <p:nvPr/>
+      </p:nvGrpSpPr>
+      <p:grpSpPr>
+        <a:xfrm>
+          <a:off x="0" y="0"/>
+          <a:ext cx="0" cy="0"/>
+          <a:chOff x="0" y="0"/>
+          <a:chExt cx="0" cy="0"/>
+        </a:xfrm>
+      </p:grpSpPr>
+      <p:sp>
+        <p:nvSpPr>
+          <p:cNvPr id="2" name="Title 1">
+            <a:extLst>
+              <a:ext uri="{FF2B5EF4-FFF2-40B4-BE49-F238E27FC236}">
+                <a16:creationId xmlns:a16="http://schemas.microsoft.com/office/drawing/2014/main" id="{04683A32-94E7-8647-9C38-AACDDB20AE0A}"/>
+              </a:ext>
+            </a:extLst>
+          </p:cNvPr>
+          <p:cNvSpPr>
+            <a:spLocks noGrp="1"/>
+          </p:cNvSpPr>
+          <p:nvPr>
+            <p:ph type="title"/>
+          </p:nvPr>
+        </p:nvSpPr>
+        <p:spPr/>
+        <p:txBody>
+          <a:bodyPr/>
+          <a:lstStyle/>
+          <a:p>
+            <a:r>
+              <a:rPr lang="en-US" dirty="0"/>
+              <a:t>What to </a:t>
+            </a:r>
+            <a:r>
+              <a:rPr lang="en-US" dirty="0" err="1"/>
+              <a:t>optimise</a:t>
+            </a:r>
+            <a:r>
+              <a:rPr lang="en-US" dirty="0"/>
+              <a:t>: currently discrete search spaces</a:t>
+            </a:r>
+          </a:p>
+        </p:txBody>
+      </p:sp>
+      <p:sp>
+        <p:nvSpPr>
+          <p:cNvPr id="3" name="Content Placeholder 2">
+            <a:extLst>
+              <a:ext uri="{FF2B5EF4-FFF2-40B4-BE49-F238E27FC236}">
+                <a16:creationId xmlns:a16="http://schemas.microsoft.com/office/drawing/2014/main" id="{25880BEE-B02B-1948-A9D7-28C000719A17}"/>
+              </a:ext>
+            </a:extLst>
+          </p:cNvPr>
+          <p:cNvSpPr>
+            <a:spLocks noGrp="1"/>
+          </p:cNvSpPr>
+          <p:nvPr>
+            <p:ph idx="1"/>
+          </p:nvPr>
+        </p:nvSpPr>
+        <p:spPr/>
+        <p:txBody>
+          <a:bodyPr>
+            <a:normAutofit fontScale="92500" lnSpcReduction="10000"/>
+          </a:bodyPr>
+          <a:lstStyle/>
+          <a:p>
+            <a:r>
+              <a:rPr lang="en-US" dirty="0"/>
+              <a:t>Each point in the space is specified as an array of </a:t>
+            </a:r>
+            <a:r>
+              <a:rPr lang="en-US" dirty="0" err="1"/>
+              <a:t>int</a:t>
+            </a:r>
+            <a:endParaRPr lang="en-US" dirty="0"/>
+          </a:p>
+          <a:p>
+            <a:pPr lvl="1"/>
+            <a:r>
+              <a:rPr lang="en-US" dirty="0"/>
+              <a:t>E.g. </a:t>
+            </a:r>
+            <a:r>
+              <a:rPr lang="en-GB" b="1" dirty="0"/>
+              <a:t>{2, 0, 4, 1, 3, 0, 0, 2}</a:t>
+            </a:r>
+            <a:r>
+              <a:rPr lang="en-GB" dirty="0"/>
+              <a:t>  </a:t>
+            </a:r>
+            <a:br>
+              <a:rPr lang="en-GB" dirty="0"/>
+            </a:br>
+            <a:r>
+              <a:rPr lang="en-GB" dirty="0"/>
+              <a:t>What does this mean?</a:t>
+            </a:r>
+            <a:endParaRPr lang="en-US" dirty="0"/>
+          </a:p>
+          <a:p>
+            <a:r>
+              <a:rPr lang="en-US" dirty="0"/>
+              <a:t>Each integer is an index to an array of parameter values</a:t>
+            </a:r>
+          </a:p>
+          <a:p>
+            <a:r>
+              <a:rPr lang="en-US" dirty="0"/>
+              <a:t>Currently the value arrays can be of type:</a:t>
+            </a:r>
+          </a:p>
+          <a:p>
+            <a:pPr lvl="1"/>
+            <a:r>
+              <a:rPr lang="en-US" b="1" dirty="0"/>
+              <a:t>double</a:t>
+            </a:r>
+          </a:p>
+          <a:p>
+            <a:pPr lvl="1"/>
+            <a:r>
+              <a:rPr lang="en-US" b="1" dirty="0" err="1"/>
+              <a:t>boolean</a:t>
+            </a:r>
+            <a:endParaRPr lang="en-US" b="1" dirty="0"/>
+          </a:p>
+          <a:p>
+            <a:pPr lvl="1"/>
+            <a:r>
+              <a:rPr lang="en-US" b="1" dirty="0" err="1"/>
+              <a:t>int</a:t>
+            </a:r>
+            <a:endParaRPr lang="en-US" b="1" dirty="0"/>
+          </a:p>
+          <a:p>
+            <a:r>
+              <a:rPr lang="en-US" dirty="0"/>
+              <a:t>This can easily be extended to any other type</a:t>
+            </a:r>
+          </a:p>
+          <a:p>
+            <a:r>
+              <a:rPr lang="en-US" dirty="0"/>
+              <a:t>The algorithm aims to find good combinations of parameters</a:t>
+            </a:r>
+          </a:p>
+          <a:p>
+            <a:r>
+              <a:rPr lang="en-US" dirty="0"/>
+              <a:t>And report the statistics of those choices</a:t>
+            </a:r>
+          </a:p>
+        </p:txBody>
+      </p:sp>
+    </p:spTree>
+    <p:extLst>
+      <p:ext uri="{BB962C8B-B14F-4D97-AF65-F5344CB8AC3E}">
+        <p14:creationId xmlns:p14="http://schemas.microsoft.com/office/powerpoint/2010/main" val="2374388058"/>
+      </p:ext>
+    </p:extLst>
+  </p:cSld>
+  <p:clrMapOvr>
+    <a:masterClrMapping/>
+  </p:clrMapOvr>
+</p:sld>
+</file>
+
+<file path=ppt/slides/slide5.xml><?xml version="1.0" encoding="utf-8"?>
+<p:sld xmlns:a="http://schemas.openxmlformats.org/drawingml/2006/main" xmlns:r="http://schemas.openxmlformats.org/officeDocument/2006/relationships" xmlns:p="http://schemas.openxmlformats.org/presentationml/2006/main">
+  <p:cSld>
+    <p:spTree>
+      <p:nvGrpSpPr>
+        <p:cNvPr id="1" name=""/>
+        <p:cNvGrpSpPr/>
+        <p:nvPr/>
+      </p:nvGrpSpPr>
+      <p:grpSpPr>
+        <a:xfrm>
+          <a:off x="0" y="0"/>
+          <a:ext cx="0" cy="0"/>
+          <a:chOff x="0" y="0"/>
+          <a:chExt cx="0" cy="0"/>
+        </a:xfrm>
+      </p:grpSpPr>
+      <p:sp>
+        <p:nvSpPr>
+          <p:cNvPr id="2" name="Title 1">
+            <a:extLst>
+              <a:ext uri="{FF2B5EF4-FFF2-40B4-BE49-F238E27FC236}">
+                <a16:creationId xmlns:a16="http://schemas.microsoft.com/office/drawing/2014/main" id="{103DD891-A79D-7C4E-813C-AA24319471A7}"/>
+              </a:ext>
+            </a:extLst>
+          </p:cNvPr>
+          <p:cNvSpPr>
+            <a:spLocks noGrp="1"/>
+          </p:cNvSpPr>
+          <p:nvPr>
+            <p:ph type="title"/>
+          </p:nvPr>
+        </p:nvSpPr>
+        <p:spPr/>
+        <p:txBody>
+          <a:bodyPr/>
+          <a:lstStyle/>
+          <a:p>
+            <a:r>
+              <a:rPr lang="en-US" dirty="0"/>
+              <a:t>How this looks in Software</a:t>
+            </a:r>
+          </a:p>
+        </p:txBody>
+      </p:sp>
+      <p:sp>
+        <p:nvSpPr>
+          <p:cNvPr id="3" name="Content Placeholder 2">
+            <a:extLst>
+              <a:ext uri="{FF2B5EF4-FFF2-40B4-BE49-F238E27FC236}">
+                <a16:creationId xmlns:a16="http://schemas.microsoft.com/office/drawing/2014/main" id="{691C5E21-D129-2B47-B876-B100A8E98A30}"/>
+              </a:ext>
+            </a:extLst>
+          </p:cNvPr>
+          <p:cNvSpPr>
+            <a:spLocks noGrp="1"/>
+          </p:cNvSpPr>
+          <p:nvPr>
+            <p:ph idx="1"/>
+          </p:nvPr>
+        </p:nvSpPr>
+        <p:spPr/>
+        <p:txBody>
+          <a:bodyPr/>
+          <a:lstStyle/>
+          <a:p>
+            <a:r>
+              <a:rPr lang="en-US" dirty="0"/>
+              <a:t>Might seem a bit messy, but it’s all done via interfaces</a:t>
+            </a:r>
+          </a:p>
+          <a:p>
+            <a:r>
+              <a:rPr lang="en-US" dirty="0"/>
+              <a:t>Key is AnnotatedFitnessLandscape</a:t>
+            </a:r>
+          </a:p>
+          <a:p>
+            <a:endParaRPr lang="en-US" dirty="0"/>
+          </a:p>
+          <a:p>
+            <a:pPr marL="0" indent="0">
+              <a:buNone/>
+            </a:pPr>
+            <a:br>
+              <a:rPr lang="en-GB" dirty="0"/>
+            </a:br>
+            <a:r>
+              <a:rPr lang="en-GB" b="1" dirty="0"/>
+              <a:t>public interface </a:t>
+            </a:r>
+            <a:r>
+              <a:rPr lang="en-GB" dirty="0" err="1"/>
+              <a:t>AnnotatedFitnessSpace</a:t>
+            </a:r>
+            <a:br>
+              <a:rPr lang="en-GB" dirty="0"/>
+            </a:br>
+            <a:r>
+              <a:rPr lang="en-GB" dirty="0"/>
+              <a:t>        </a:t>
+            </a:r>
+            <a:r>
+              <a:rPr lang="en-GB" b="1" dirty="0"/>
+              <a:t>extends </a:t>
+            </a:r>
+            <a:r>
+              <a:rPr lang="en-GB" dirty="0" err="1"/>
+              <a:t>SolutionEvaluator</a:t>
+            </a:r>
+            <a:r>
+              <a:rPr lang="en-GB" dirty="0"/>
+              <a:t>, </a:t>
+            </a:r>
+            <a:r>
+              <a:rPr lang="en-GB" dirty="0" err="1"/>
+              <a:t>AnnotatedSearchSpace</a:t>
+            </a:r>
+            <a:r>
+              <a:rPr lang="en-GB" dirty="0"/>
+              <a:t> {</a:t>
+            </a:r>
+            <a:br>
+              <a:rPr lang="en-GB" dirty="0"/>
+            </a:br>
+            <a:r>
+              <a:rPr lang="en-GB" dirty="0"/>
+              <a:t>}</a:t>
+            </a:r>
+            <a:br>
+              <a:rPr lang="en-GB" dirty="0"/>
+            </a:br>
+            <a:endParaRPr lang="en-US" dirty="0"/>
+          </a:p>
+        </p:txBody>
+      </p:sp>
+    </p:spTree>
+    <p:extLst>
+      <p:ext uri="{BB962C8B-B14F-4D97-AF65-F5344CB8AC3E}">
+        <p14:creationId xmlns:p14="http://schemas.microsoft.com/office/powerpoint/2010/main" val="83022543"/>
+      </p:ext>
+    </p:extLst>
+  </p:cSld>
+  <p:clrMapOvr>
+    <a:masterClrMapping/>
+  </p:clrMapOvr>
+</p:sld>
+</file>
+
+<file path=ppt/slides/slide6.xml><?xml version="1.0" encoding="utf-8"?>
+<p:sld xmlns:a="http://schemas.openxmlformats.org/drawingml/2006/main" xmlns:r="http://schemas.openxmlformats.org/officeDocument/2006/relationships" xmlns:p="http://schemas.openxmlformats.org/presentationml/2006/main">
+  <p:cSld>
+    <p:spTree>
+      <p:nvGrpSpPr>
+        <p:cNvPr id="1" name=""/>
+        <p:cNvGrpSpPr/>
+        <p:nvPr/>
+      </p:nvGrpSpPr>
+      <p:grpSpPr>
+        <a:xfrm>
+          <a:off x="0" y="0"/>
+          <a:ext cx="0" cy="0"/>
+          <a:chOff x="0" y="0"/>
+          <a:chExt cx="0" cy="0"/>
+        </a:xfrm>
+      </p:grpSpPr>
+      <p:sp>
+        <p:nvSpPr>
+          <p:cNvPr id="2" name="Title 1">
+            <a:extLst>
+              <a:ext uri="{FF2B5EF4-FFF2-40B4-BE49-F238E27FC236}">
+                <a16:creationId xmlns:a16="http://schemas.microsoft.com/office/drawing/2014/main" id="{EE1E4451-8D7A-574B-BA12-456382AAA0B5}"/>
+              </a:ext>
+            </a:extLst>
+          </p:cNvPr>
+          <p:cNvSpPr>
+            <a:spLocks noGrp="1"/>
+          </p:cNvSpPr>
+          <p:nvPr>
+            <p:ph type="title"/>
+          </p:nvPr>
+        </p:nvSpPr>
+        <p:spPr/>
+        <p:txBody>
+          <a:bodyPr/>
+          <a:lstStyle/>
+          <a:p>
+            <a:r>
+              <a:rPr lang="en-US" dirty="0" err="1"/>
+              <a:t>SolutionEvaluator</a:t>
+            </a:r>
+            <a:endParaRPr lang="en-US" dirty="0"/>
+          </a:p>
+        </p:txBody>
+      </p:sp>
+      <p:sp>
+        <p:nvSpPr>
+          <p:cNvPr id="3" name="Content Placeholder 2">
+            <a:extLst>
+              <a:ext uri="{FF2B5EF4-FFF2-40B4-BE49-F238E27FC236}">
+                <a16:creationId xmlns:a16="http://schemas.microsoft.com/office/drawing/2014/main" id="{37F34974-7EF3-024D-BBCB-D650FA3750EF}"/>
+              </a:ext>
+            </a:extLst>
+          </p:cNvPr>
+          <p:cNvSpPr>
+            <a:spLocks noGrp="1"/>
+          </p:cNvSpPr>
+          <p:nvPr>
+            <p:ph idx="1"/>
+          </p:nvPr>
+        </p:nvSpPr>
+        <p:spPr/>
+        <p:txBody>
+          <a:bodyPr>
+            <a:normAutofit fontScale="85000" lnSpcReduction="20000"/>
+          </a:bodyPr>
+          <a:lstStyle/>
+          <a:p>
+            <a:pPr marL="0" indent="0">
+              <a:buNone/>
+            </a:pPr>
+            <a:br>
+              <a:rPr lang="en-GB" dirty="0"/>
+            </a:br>
+            <a:r>
+              <a:rPr lang="en-GB" b="1" dirty="0"/>
+              <a:t>public interface </a:t>
+            </a:r>
+            <a:r>
+              <a:rPr lang="en-GB" dirty="0" err="1"/>
+              <a:t>SolutionEvaluator</a:t>
+            </a:r>
+            <a:r>
+              <a:rPr lang="en-GB" dirty="0"/>
+              <a:t> {</a:t>
+            </a:r>
+            <a:br>
+              <a:rPr lang="en-GB" dirty="0"/>
+            </a:br>
+            <a:r>
+              <a:rPr lang="en-GB" dirty="0"/>
+              <a:t>    </a:t>
+            </a:r>
+            <a:r>
+              <a:rPr lang="en-GB" i="1" dirty="0"/>
+              <a:t>// call reset before running</a:t>
+            </a:r>
+            <a:br>
+              <a:rPr lang="en-GB" i="1" dirty="0"/>
+            </a:br>
+            <a:r>
+              <a:rPr lang="en-GB" i="1" dirty="0"/>
+              <a:t>    </a:t>
+            </a:r>
+            <a:r>
+              <a:rPr lang="en-GB" b="1" dirty="0"/>
+              <a:t>public void </a:t>
+            </a:r>
+            <a:r>
+              <a:rPr lang="en-GB" dirty="0"/>
+              <a:t>reset();</a:t>
+            </a:r>
+            <a:br>
+              <a:rPr lang="en-GB" dirty="0"/>
+            </a:br>
+            <a:r>
+              <a:rPr lang="en-GB" dirty="0"/>
+              <a:t>    </a:t>
+            </a:r>
+            <a:r>
+              <a:rPr lang="en-GB" b="1" dirty="0"/>
+              <a:t>double </a:t>
+            </a:r>
+            <a:r>
+              <a:rPr lang="en-GB" dirty="0"/>
+              <a:t>evaluate(</a:t>
+            </a:r>
+            <a:r>
+              <a:rPr lang="en-GB" b="1" dirty="0" err="1"/>
+              <a:t>int</a:t>
+            </a:r>
+            <a:r>
+              <a:rPr lang="en-GB" dirty="0"/>
+              <a:t>[] solution);</a:t>
+            </a:r>
+            <a:br>
+              <a:rPr lang="en-GB" dirty="0"/>
+            </a:br>
+            <a:br>
+              <a:rPr lang="en-GB" dirty="0"/>
+            </a:br>
+            <a:r>
+              <a:rPr lang="en-GB" dirty="0"/>
+              <a:t>    </a:t>
+            </a:r>
+            <a:r>
+              <a:rPr lang="en-GB" dirty="0" err="1"/>
+              <a:t>SearchSpace</a:t>
+            </a:r>
+            <a:r>
+              <a:rPr lang="en-GB" dirty="0"/>
+              <a:t> </a:t>
+            </a:r>
+            <a:r>
+              <a:rPr lang="en-GB" dirty="0" err="1"/>
+              <a:t>searchSpace</a:t>
+            </a:r>
+            <a:r>
+              <a:rPr lang="en-GB" dirty="0"/>
+              <a:t>();</a:t>
+            </a:r>
+            <a:br>
+              <a:rPr lang="en-GB" dirty="0"/>
+            </a:br>
+            <a:r>
+              <a:rPr lang="en-GB" dirty="0"/>
+              <a:t>    </a:t>
+            </a:r>
+            <a:r>
+              <a:rPr lang="en-GB" b="1" dirty="0" err="1"/>
+              <a:t>int</a:t>
+            </a:r>
+            <a:r>
+              <a:rPr lang="en-GB" b="1" dirty="0"/>
+              <a:t> </a:t>
+            </a:r>
+            <a:r>
+              <a:rPr lang="en-GB" dirty="0" err="1"/>
+              <a:t>nEvals</a:t>
+            </a:r>
+            <a:r>
+              <a:rPr lang="en-GB" dirty="0"/>
+              <a:t>();</a:t>
+            </a:r>
+            <a:br>
+              <a:rPr lang="en-GB" dirty="0"/>
+            </a:br>
+            <a:br>
+              <a:rPr lang="en-GB" dirty="0"/>
+            </a:br>
+            <a:r>
+              <a:rPr lang="en-GB" dirty="0"/>
+              <a:t>    </a:t>
+            </a:r>
+            <a:r>
+              <a:rPr lang="en-GB" dirty="0" err="1"/>
+              <a:t>EvolutionLogger</a:t>
+            </a:r>
+            <a:r>
+              <a:rPr lang="en-GB" dirty="0"/>
+              <a:t> logger();</a:t>
+            </a:r>
+            <a:br>
+              <a:rPr lang="en-GB" dirty="0"/>
+            </a:br>
+            <a:br>
+              <a:rPr lang="en-GB" dirty="0"/>
+            </a:br>
+            <a:r>
+              <a:rPr lang="en-GB" dirty="0"/>
+              <a:t>    // …</a:t>
+            </a:r>
+            <a:br>
+              <a:rPr lang="en-GB" dirty="0"/>
+            </a:br>
+            <a:br>
+              <a:rPr lang="en-GB" dirty="0"/>
+            </a:br>
+            <a:r>
+              <a:rPr lang="en-GB" dirty="0"/>
+              <a:t>}</a:t>
+            </a:r>
+            <a:br>
+              <a:rPr lang="en-GB" dirty="0"/>
+            </a:br>
+            <a:endParaRPr lang="en-US" dirty="0"/>
+          </a:p>
+        </p:txBody>
+      </p:sp>
+    </p:spTree>
+    <p:extLst>
+      <p:ext uri="{BB962C8B-B14F-4D97-AF65-F5344CB8AC3E}">
+        <p14:creationId xmlns:p14="http://schemas.microsoft.com/office/powerpoint/2010/main" val="2860471436"/>
+      </p:ext>
+    </p:extLst>
+  </p:cSld>
+  <p:clrMapOvr>
+    <a:masterClrMapping/>
+  </p:clrMapOvr>
+</p:sld>
+</file>
+
+<file path=ppt/slides/slide7.xml><?xml version="1.0" encoding="utf-8"?>
+<p:sld xmlns:a="http://schemas.openxmlformats.org/drawingml/2006/main" xmlns:r="http://schemas.openxmlformats.org/officeDocument/2006/relationships" xmlns:p="http://schemas.openxmlformats.org/presentationml/2006/main">
+  <p:cSld>
+    <p:spTree>
+      <p:nvGrpSpPr>
+        <p:cNvPr id="1" name=""/>
+        <p:cNvGrpSpPr/>
+        <p:nvPr/>
+      </p:nvGrpSpPr>
+      <p:grpSpPr>
+        <a:xfrm>
+          <a:off x="0" y="0"/>
+          <a:ext cx="0" cy="0"/>
+          <a:chOff x="0" y="0"/>
+          <a:chExt cx="0" cy="0"/>
+        </a:xfrm>
+      </p:grpSpPr>
+      <p:sp>
+        <p:nvSpPr>
+          <p:cNvPr id="2" name="Title 1">
+            <a:extLst>
+              <a:ext uri="{FF2B5EF4-FFF2-40B4-BE49-F238E27FC236}">
+                <a16:creationId xmlns:a16="http://schemas.microsoft.com/office/drawing/2014/main" id="{7C147A24-7855-724D-98FA-7CC8FC41E743}"/>
+              </a:ext>
+            </a:extLst>
+          </p:cNvPr>
+          <p:cNvSpPr>
+            <a:spLocks noGrp="1"/>
+          </p:cNvSpPr>
+          <p:nvPr>
+            <p:ph type="title"/>
+          </p:nvPr>
+        </p:nvSpPr>
+        <p:spPr/>
+        <p:txBody>
+          <a:bodyPr/>
+          <a:lstStyle/>
+          <a:p>
+            <a:r>
+              <a:rPr lang="en-US" dirty="0" err="1"/>
+              <a:t>SearchSpace</a:t>
+            </a:r>
+            <a:endParaRPr lang="en-US" dirty="0"/>
+          </a:p>
+        </p:txBody>
+      </p:sp>
+      <p:sp>
+        <p:nvSpPr>
+          <p:cNvPr id="3" name="Content Placeholder 2">
+            <a:extLst>
+              <a:ext uri="{FF2B5EF4-FFF2-40B4-BE49-F238E27FC236}">
+                <a16:creationId xmlns:a16="http://schemas.microsoft.com/office/drawing/2014/main" id="{562AB58D-C113-3046-9102-813E17D7D129}"/>
+              </a:ext>
+            </a:extLst>
+          </p:cNvPr>
+          <p:cNvSpPr>
+            <a:spLocks noGrp="1"/>
+          </p:cNvSpPr>
+          <p:nvPr>
+            <p:ph idx="1"/>
+          </p:nvPr>
+        </p:nvSpPr>
+        <p:spPr/>
+        <p:txBody>
+          <a:bodyPr/>
+          <a:lstStyle/>
+          <a:p>
+            <a:pPr marL="0" indent="0">
+              <a:buNone/>
+            </a:pPr>
+            <a:br>
+              <a:rPr lang="en-GB" dirty="0"/>
+            </a:br>
+            <a:r>
+              <a:rPr lang="en-GB" b="1" dirty="0"/>
+              <a:t>public interface </a:t>
+            </a:r>
+            <a:r>
+              <a:rPr lang="en-GB" dirty="0" err="1"/>
+              <a:t>SearchSpace</a:t>
+            </a:r>
+            <a:r>
+              <a:rPr lang="en-GB" dirty="0"/>
+              <a:t> {</a:t>
+            </a:r>
+            <a:br>
+              <a:rPr lang="en-GB" dirty="0"/>
+            </a:br>
+            <a:r>
+              <a:rPr lang="en-GB" dirty="0"/>
+              <a:t>    </a:t>
+            </a:r>
+            <a:r>
+              <a:rPr lang="en-GB" i="1" dirty="0"/>
+              <a:t>// number of dimensions</a:t>
+            </a:r>
+            <a:br>
+              <a:rPr lang="en-GB" i="1" dirty="0"/>
+            </a:br>
+            <a:r>
+              <a:rPr lang="en-GB" i="1" dirty="0"/>
+              <a:t>    </a:t>
+            </a:r>
+            <a:r>
+              <a:rPr lang="en-GB" b="1" dirty="0" err="1"/>
+              <a:t>int</a:t>
+            </a:r>
+            <a:r>
+              <a:rPr lang="en-GB" b="1" dirty="0"/>
+              <a:t> </a:t>
+            </a:r>
+            <a:r>
+              <a:rPr lang="en-GB" dirty="0" err="1"/>
+              <a:t>nDims</a:t>
+            </a:r>
+            <a:r>
+              <a:rPr lang="en-GB" dirty="0"/>
+              <a:t>();</a:t>
+            </a:r>
+            <a:br>
+              <a:rPr lang="en-GB" dirty="0"/>
+            </a:br>
+            <a:r>
+              <a:rPr lang="en-GB" dirty="0"/>
+              <a:t>    </a:t>
+            </a:r>
+            <a:r>
+              <a:rPr lang="en-GB" i="1" dirty="0"/>
+              <a:t>// number of </a:t>
+            </a:r>
+            <a:r>
+              <a:rPr lang="en-GB" i="1" dirty="0" err="1"/>
+              <a:t>possile</a:t>
+            </a:r>
+            <a:r>
+              <a:rPr lang="en-GB" i="1" dirty="0"/>
+              <a:t> values in the </a:t>
+            </a:r>
+            <a:r>
+              <a:rPr lang="en-GB" i="1" dirty="0" err="1"/>
+              <a:t>ith</a:t>
+            </a:r>
+            <a:r>
+              <a:rPr lang="en-GB" i="1" dirty="0"/>
+              <a:t> dimension</a:t>
+            </a:r>
+            <a:br>
+              <a:rPr lang="en-GB" i="1" dirty="0"/>
+            </a:br>
+            <a:r>
+              <a:rPr lang="en-GB" i="1" dirty="0"/>
+              <a:t>    </a:t>
+            </a:r>
+            <a:r>
+              <a:rPr lang="en-GB" b="1" dirty="0" err="1"/>
+              <a:t>int</a:t>
+            </a:r>
+            <a:r>
+              <a:rPr lang="en-GB" b="1" dirty="0"/>
+              <a:t> </a:t>
+            </a:r>
+            <a:r>
+              <a:rPr lang="en-GB" dirty="0" err="1"/>
+              <a:t>nValues</a:t>
+            </a:r>
+            <a:r>
+              <a:rPr lang="en-GB" dirty="0"/>
+              <a:t>(</a:t>
+            </a:r>
+            <a:r>
+              <a:rPr lang="en-GB" b="1" dirty="0" err="1"/>
+              <a:t>int</a:t>
+            </a:r>
+            <a:r>
+              <a:rPr lang="en-GB" b="1" dirty="0"/>
+              <a:t> </a:t>
+            </a:r>
+            <a:r>
+              <a:rPr lang="en-GB" dirty="0" err="1"/>
+              <a:t>i</a:t>
+            </a:r>
+            <a:r>
+              <a:rPr lang="en-GB" dirty="0"/>
+              <a:t>);</a:t>
+            </a:r>
+            <a:br>
+              <a:rPr lang="en-GB" dirty="0"/>
+            </a:br>
+            <a:r>
+              <a:rPr lang="en-GB" dirty="0"/>
+              <a:t>}</a:t>
+            </a:r>
+            <a:br>
+              <a:rPr lang="en-GB" dirty="0"/>
+            </a:br>
+            <a:endParaRPr lang="en-US" dirty="0"/>
+          </a:p>
+        </p:txBody>
+      </p:sp>
+    </p:spTree>
+    <p:extLst>
+      <p:ext uri="{BB962C8B-B14F-4D97-AF65-F5344CB8AC3E}">
+        <p14:creationId xmlns:p14="http://schemas.microsoft.com/office/powerpoint/2010/main" val="92812852"/>
+      </p:ext>
+    </p:extLst>
+  </p:cSld>
+  <p:clrMapOvr>
+    <a:masterClrMapping/>
+  </p:clrMapOvr>
+</p:sld>
+</file>
+
+<file path=ppt/slides/slide8.xml><?xml version="1.0" encoding="utf-8"?>
+<p:sld xmlns:a="http://schemas.openxmlformats.org/drawingml/2006/main" xmlns:r="http://schemas.openxmlformats.org/officeDocument/2006/relationships" xmlns:p="http://schemas.openxmlformats.org/presentationml/2006/main">
+  <p:cSld>
+    <p:spTree>
+      <p:nvGrpSpPr>
+        <p:cNvPr id="1" name=""/>
+        <p:cNvGrpSpPr/>
+        <p:nvPr/>
+      </p:nvGrpSpPr>
+      <p:grpSpPr>
+        <a:xfrm>
+          <a:off x="0" y="0"/>
+          <a:ext cx="0" cy="0"/>
+          <a:chOff x="0" y="0"/>
+          <a:chExt cx="0" cy="0"/>
+        </a:xfrm>
+      </p:grpSpPr>
+      <p:sp>
+        <p:nvSpPr>
+          <p:cNvPr id="2" name="Title 1">
+            <a:extLst>
+              <a:ext uri="{FF2B5EF4-FFF2-40B4-BE49-F238E27FC236}">
+                <a16:creationId xmlns:a16="http://schemas.microsoft.com/office/drawing/2014/main" id="{CACC1BA5-C3A7-3E42-AAB6-A098DF1EF591}"/>
+              </a:ext>
+            </a:extLst>
+          </p:cNvPr>
+          <p:cNvSpPr>
+            <a:spLocks noGrp="1"/>
+          </p:cNvSpPr>
+          <p:nvPr>
+            <p:ph type="title"/>
+          </p:nvPr>
+        </p:nvSpPr>
+        <p:spPr/>
+        <p:txBody>
+          <a:bodyPr/>
+          <a:lstStyle/>
+          <a:p>
+            <a:r>
+              <a:rPr lang="en-US" dirty="0" err="1"/>
+              <a:t>AnnotatedSearchSpace</a:t>
+            </a:r>
+            <a:endParaRPr lang="en-US" dirty="0"/>
+          </a:p>
+        </p:txBody>
+      </p:sp>
+      <p:sp>
+        <p:nvSpPr>
+          <p:cNvPr id="3" name="Content Placeholder 2">
+            <a:extLst>
+              <a:ext uri="{FF2B5EF4-FFF2-40B4-BE49-F238E27FC236}">
+                <a16:creationId xmlns:a16="http://schemas.microsoft.com/office/drawing/2014/main" id="{E307042A-DC81-F541-B6BA-2AD95C44D739}"/>
+              </a:ext>
+            </a:extLst>
+          </p:cNvPr>
+          <p:cNvSpPr>
+            <a:spLocks noGrp="1"/>
+          </p:cNvSpPr>
+          <p:nvPr>
+            <p:ph idx="1"/>
+          </p:nvPr>
+        </p:nvSpPr>
+        <p:spPr/>
+        <p:txBody>
+          <a:bodyPr/>
+          <a:lstStyle/>
+          <a:p>
+            <a:pPr marL="0" indent="0">
+              <a:buNone/>
+            </a:pPr>
+            <a:br>
+              <a:rPr lang="en-GB" dirty="0"/>
+            </a:br>
+            <a:r>
+              <a:rPr lang="en-GB" b="1" dirty="0"/>
+              <a:t>public interface </a:t>
+            </a:r>
+            <a:r>
+              <a:rPr lang="en-GB" dirty="0" err="1"/>
+              <a:t>AnnotatedSearchSpace</a:t>
+            </a:r>
+            <a:r>
+              <a:rPr lang="en-GB" dirty="0"/>
+              <a:t> </a:t>
+            </a:r>
+            <a:r>
+              <a:rPr lang="en-GB" b="1" dirty="0"/>
+              <a:t>extends </a:t>
+            </a:r>
+            <a:r>
+              <a:rPr lang="en-GB" dirty="0" err="1"/>
+              <a:t>SearchSpace</a:t>
+            </a:r>
+            <a:r>
+              <a:rPr lang="en-GB" dirty="0"/>
+              <a:t> {</a:t>
+            </a:r>
+            <a:br>
+              <a:rPr lang="en-GB" dirty="0"/>
+            </a:br>
+            <a:r>
+              <a:rPr lang="en-GB" dirty="0"/>
+              <a:t>    Param[] </a:t>
+            </a:r>
+            <a:r>
+              <a:rPr lang="en-GB" dirty="0" err="1"/>
+              <a:t>getParams</a:t>
+            </a:r>
+            <a:r>
+              <a:rPr lang="en-GB" dirty="0"/>
+              <a:t>();</a:t>
+            </a:r>
+            <a:br>
+              <a:rPr lang="en-GB" dirty="0"/>
+            </a:br>
+            <a:r>
+              <a:rPr lang="en-GB" dirty="0"/>
+              <a:t>}</a:t>
+            </a:r>
+            <a:br>
+              <a:rPr lang="en-GB" dirty="0"/>
+            </a:br>
+            <a:endParaRPr lang="en-US" dirty="0"/>
+          </a:p>
+        </p:txBody>
+      </p:sp>
+    </p:spTree>
+    <p:extLst>
+      <p:ext uri="{BB962C8B-B14F-4D97-AF65-F5344CB8AC3E}">
+        <p14:creationId xmlns:p14="http://schemas.microsoft.com/office/powerpoint/2010/main" val="3055101993"/>
       </p:ext>
     </p:extLst>
   </p:cSld>
@@ -7478,7 +8508,7 @@
           <p:cNvPr id="2" name="Title 1">
             <a:extLst>
               <a:ext uri="{FF2B5EF4-FFF2-40B4-BE49-F238E27FC236}">
-                <a16:creationId xmlns:a16="http://schemas.microsoft.com/office/drawing/2014/main" id="{B128E0D2-9165-494E-AAAE-30EE0B72A00E}"/>
+                <a16:creationId xmlns:a16="http://schemas.microsoft.com/office/drawing/2014/main" id="{CF357B6A-5402-7942-84C5-84191733B7D9}"/>
               </a:ext>
             </a:extLst>
           </p:cNvPr>
@@ -7491,66 +8521,254 @@
         </p:nvSpPr>
         <p:spPr/>
         <p:txBody>
+          <a:bodyPr/>
+          <a:lstStyle/>
+          <a:p>
+            <a:r>
+              <a:rPr lang="en-US" dirty="0"/>
+              <a:t>Param</a:t>
+            </a:r>
+          </a:p>
+        </p:txBody>
+      </p:sp>
+      <p:sp>
+        <p:nvSpPr>
+          <p:cNvPr id="3" name="Content Placeholder 2">
+            <a:extLst>
+              <a:ext uri="{FF2B5EF4-FFF2-40B4-BE49-F238E27FC236}">
+                <a16:creationId xmlns:a16="http://schemas.microsoft.com/office/drawing/2014/main" id="{118D2DB8-EA25-2048-866E-2733D2EA5BE8}"/>
+              </a:ext>
+            </a:extLst>
+          </p:cNvPr>
+          <p:cNvSpPr>
+            <a:spLocks noGrp="1"/>
+          </p:cNvSpPr>
+          <p:nvPr>
+            <p:ph idx="1"/>
+          </p:nvPr>
+        </p:nvSpPr>
+        <p:spPr/>
+        <p:txBody>
           <a:bodyPr>
-            <a:normAutofit fontScale="90000"/>
+            <a:normAutofit fontScale="77500" lnSpcReduction="20000"/>
           </a:bodyPr>
           <a:lstStyle/>
           <a:p>
-            <a:r>
-              <a:rPr lang="en-GB" dirty="0"/>
-              <a:t>Green bars: exploitation</a:t>
-            </a:r>
+            <a:pPr marL="0" indent="0">
+              <a:buNone/>
+            </a:pPr>
             <a:br>
               <a:rPr lang="en-GB" dirty="0"/>
             </a:br>
             <a:r>
-              <a:rPr lang="en-GB" dirty="0"/>
-              <a:t>Blue bars: exploration</a:t>
+              <a:rPr lang="en-GB" b="1" dirty="0"/>
+              <a:t>public abstract class </a:t>
+            </a:r>
+            <a:r>
+              <a:rPr lang="en-GB" dirty="0"/>
+              <a:t>Param {</a:t>
             </a:r>
             <a:br>
               <a:rPr lang="en-GB" dirty="0"/>
             </a:br>
             <a:r>
               <a:rPr lang="en-GB" dirty="0"/>
-              <a:t>Green + Blue = UCB value</a:t>
-            </a:r>
-            <a:endParaRPr lang="en-US" dirty="0"/>
-          </a:p>
-        </p:txBody>
-      </p:sp>
-      <p:pic>
-        <p:nvPicPr>
-          <p:cNvPr id="5" name="Content Placeholder 4">
-            <a:extLst>
-              <a:ext uri="{FF2B5EF4-FFF2-40B4-BE49-F238E27FC236}">
-                <a16:creationId xmlns:a16="http://schemas.microsoft.com/office/drawing/2014/main" id="{CD9C1939-F6F6-894B-A5FD-5EF0CBDD38D9}"/>
-              </a:ext>
-            </a:extLst>
-          </p:cNvPr>
-          <p:cNvPicPr>
-            <a:picLocks noGrp="1" noChangeAspect="1"/>
-          </p:cNvPicPr>
-          <p:nvPr>
-            <p:ph idx="1"/>
-          </p:nvPr>
-        </p:nvPicPr>
-        <p:blipFill>
-          <a:blip r:embed="rId3"/>
-          <a:stretch>
-            <a:fillRect/>
-          </a:stretch>
-        </p:blipFill>
-        <p:spPr>
-          <a:xfrm>
-            <a:off x="2720773" y="1825625"/>
-            <a:ext cx="6750454" cy="4351338"/>
-          </a:xfrm>
-        </p:spPr>
-      </p:pic>
+              <a:t>    String </a:t>
+            </a:r>
+            <a:r>
+              <a:rPr lang="en-GB" b="1" dirty="0"/>
+              <a:t>name</a:t>
+            </a:r>
+            <a:r>
+              <a:rPr lang="en-GB" dirty="0"/>
+              <a:t>;</a:t>
+            </a:r>
+            <a:br>
+              <a:rPr lang="en-GB" dirty="0"/>
+            </a:br>
+            <a:br>
+              <a:rPr lang="en-GB" dirty="0"/>
+            </a:br>
+            <a:r>
+              <a:rPr lang="en-GB" dirty="0"/>
+              <a:t>    </a:t>
+            </a:r>
+            <a:r>
+              <a:rPr lang="en-GB" b="1" dirty="0"/>
+              <a:t>public </a:t>
+            </a:r>
+            <a:r>
+              <a:rPr lang="en-GB" dirty="0"/>
+              <a:t>Param </a:t>
+            </a:r>
+            <a:r>
+              <a:rPr lang="en-GB" dirty="0" err="1"/>
+              <a:t>setName</a:t>
+            </a:r>
+            <a:r>
+              <a:rPr lang="en-GB" dirty="0"/>
+              <a:t>(String name) {</a:t>
+            </a:r>
+            <a:br>
+              <a:rPr lang="en-GB" dirty="0"/>
+            </a:br>
+            <a:r>
+              <a:rPr lang="en-GB" dirty="0"/>
+              <a:t>        </a:t>
+            </a:r>
+            <a:r>
+              <a:rPr lang="en-GB" b="1" dirty="0" err="1"/>
+              <a:t>this</a:t>
+            </a:r>
+            <a:r>
+              <a:rPr lang="en-GB" dirty="0" err="1"/>
+              <a:t>.</a:t>
+            </a:r>
+            <a:r>
+              <a:rPr lang="en-GB" b="1" dirty="0" err="1"/>
+              <a:t>name</a:t>
+            </a:r>
+            <a:r>
+              <a:rPr lang="en-GB" b="1" dirty="0"/>
+              <a:t> </a:t>
+            </a:r>
+            <a:r>
+              <a:rPr lang="en-GB" dirty="0"/>
+              <a:t>= name;</a:t>
+            </a:r>
+            <a:br>
+              <a:rPr lang="en-GB" dirty="0"/>
+            </a:br>
+            <a:r>
+              <a:rPr lang="en-GB" dirty="0"/>
+              <a:t>        </a:t>
+            </a:r>
+            <a:r>
+              <a:rPr lang="en-GB" b="1" dirty="0"/>
+              <a:t>return this</a:t>
+            </a:r>
+            <a:r>
+              <a:rPr lang="en-GB" dirty="0"/>
+              <a:t>;</a:t>
+            </a:r>
+            <a:br>
+              <a:rPr lang="en-GB" dirty="0"/>
+            </a:br>
+            <a:r>
+              <a:rPr lang="en-GB" dirty="0"/>
+              <a:t>    }</a:t>
+            </a:r>
+            <a:br>
+              <a:rPr lang="en-GB" dirty="0"/>
+            </a:br>
+            <a:br>
+              <a:rPr lang="en-GB" dirty="0"/>
+            </a:br>
+            <a:r>
+              <a:rPr lang="en-GB" dirty="0"/>
+              <a:t>    </a:t>
+            </a:r>
+            <a:r>
+              <a:rPr lang="en-GB" b="1" dirty="0"/>
+              <a:t>public </a:t>
+            </a:r>
+            <a:r>
+              <a:rPr lang="en-GB" dirty="0"/>
+              <a:t>String </a:t>
+            </a:r>
+            <a:r>
+              <a:rPr lang="en-GB" dirty="0" err="1"/>
+              <a:t>getName</a:t>
+            </a:r>
+            <a:r>
+              <a:rPr lang="en-GB" dirty="0"/>
+              <a:t>() {</a:t>
+            </a:r>
+            <a:br>
+              <a:rPr lang="en-GB" dirty="0"/>
+            </a:br>
+            <a:r>
+              <a:rPr lang="en-GB" dirty="0"/>
+              <a:t>        </a:t>
+            </a:r>
+            <a:r>
+              <a:rPr lang="en-GB" b="1" dirty="0"/>
+              <a:t>return name</a:t>
+            </a:r>
+            <a:r>
+              <a:rPr lang="en-GB" dirty="0"/>
+              <a:t>;</a:t>
+            </a:r>
+            <a:br>
+              <a:rPr lang="en-GB" dirty="0"/>
+            </a:br>
+            <a:r>
+              <a:rPr lang="en-GB" dirty="0"/>
+              <a:t>    }</a:t>
+            </a:r>
+            <a:br>
+              <a:rPr lang="en-GB" dirty="0"/>
+            </a:br>
+            <a:br>
+              <a:rPr lang="en-GB" dirty="0"/>
+            </a:br>
+            <a:br>
+              <a:rPr lang="en-GB" dirty="0"/>
+            </a:br>
+            <a:r>
+              <a:rPr lang="en-GB" dirty="0"/>
+              <a:t>    </a:t>
+            </a:r>
+            <a:r>
+              <a:rPr lang="en-GB" b="1" dirty="0"/>
+              <a:t>public abstract </a:t>
+            </a:r>
+            <a:r>
+              <a:rPr lang="en-GB" dirty="0"/>
+              <a:t>Object </a:t>
+            </a:r>
+            <a:r>
+              <a:rPr lang="en-GB" dirty="0" err="1"/>
+              <a:t>getValue</a:t>
+            </a:r>
+            <a:r>
+              <a:rPr lang="en-GB" dirty="0"/>
+              <a:t>(</a:t>
+            </a:r>
+            <a:r>
+              <a:rPr lang="en-GB" b="1" dirty="0" err="1"/>
+              <a:t>int</a:t>
+            </a:r>
+            <a:r>
+              <a:rPr lang="en-GB" b="1" dirty="0"/>
+              <a:t> </a:t>
+            </a:r>
+            <a:r>
+              <a:rPr lang="en-GB" dirty="0" err="1"/>
+              <a:t>i</a:t>
+            </a:r>
+            <a:r>
+              <a:rPr lang="en-GB"/>
+              <a:t>);</a:t>
+            </a:r>
+            <a:br>
+              <a:rPr lang="en-GB"/>
+            </a:br>
+            <a:r>
+              <a:rPr lang="en-GB"/>
+              <a:t>}</a:t>
+            </a:r>
+            <a:br>
+              <a:rPr lang="en-GB"/>
+            </a:br>
+            <a:endParaRPr lang="en-US"/>
+          </a:p>
+        </p:txBody>
+      </p:sp>
     </p:spTree>
     <p:extLst>
       <p:ext uri="{BB962C8B-B14F-4D97-AF65-F5344CB8AC3E}">
-        <p14:creationId xmlns:p14="http://schemas.microsoft.com/office/powerpoint/2010/main" val="2113553676"/>
+        <p14:creationId xmlns:p14="http://schemas.microsoft.com/office/powerpoint/2010/main" val="232825781"/>
       </p:ext>
     </p:extLst>
   </p:cSld>

</xml_diff>